<commit_message>
feat: update presentation on cost optimization for judicial actions
</commit_message>
<xml_diff>
--- a/05_Documentacao/01_Power_point/Otimização de Custos de Ações Judiciais.pptx
+++ b/05_Documentacao/01_Power_point/Otimização de Custos de Ações Judiciais.pptx
@@ -13,11 +13,15 @@
     <p:sldId id="284" r:id="rId7"/>
     <p:sldId id="283" r:id="rId8"/>
     <p:sldId id="287" r:id="rId9"/>
-    <p:sldId id="288" r:id="rId10"/>
+    <p:sldId id="297" r:id="rId10"/>
     <p:sldId id="289" r:id="rId11"/>
-    <p:sldId id="290" r:id="rId12"/>
-    <p:sldId id="291" r:id="rId13"/>
-    <p:sldId id="292" r:id="rId14"/>
+    <p:sldId id="293" r:id="rId12"/>
+    <p:sldId id="294" r:id="rId13"/>
+    <p:sldId id="290" r:id="rId14"/>
+    <p:sldId id="295" r:id="rId15"/>
+    <p:sldId id="296" r:id="rId16"/>
+    <p:sldId id="291" r:id="rId17"/>
+    <p:sldId id="292" r:id="rId18"/>
   </p:sldIdLst>
   <p:sldSz cx="12192000" cy="6858000"/>
   <p:notesSz cx="6858000" cy="9144000"/>
@@ -271,7 +275,7 @@
           <a:p>
             <a:fld id="{7C5C64AF-CB1E-4466-AA6C-9F57C4F9061D}" type="datetimeFigureOut">
               <a:rPr lang="pt-BR" smtClean="0"/>
-              <a:t>07/04/2025</a:t>
+              <a:t>28/04/2025</a:t>
             </a:fld>
             <a:endParaRPr lang="pt-BR" dirty="0"/>
           </a:p>
@@ -469,7 +473,7 @@
           <a:p>
             <a:fld id="{7C5C64AF-CB1E-4466-AA6C-9F57C4F9061D}" type="datetimeFigureOut">
               <a:rPr lang="pt-BR" smtClean="0"/>
-              <a:t>07/04/2025</a:t>
+              <a:t>28/04/2025</a:t>
             </a:fld>
             <a:endParaRPr lang="pt-BR" dirty="0"/>
           </a:p>
@@ -677,7 +681,7 @@
           <a:p>
             <a:fld id="{7C5C64AF-CB1E-4466-AA6C-9F57C4F9061D}" type="datetimeFigureOut">
               <a:rPr lang="pt-BR" smtClean="0"/>
-              <a:t>07/04/2025</a:t>
+              <a:t>28/04/2025</a:t>
             </a:fld>
             <a:endParaRPr lang="pt-BR" dirty="0"/>
           </a:p>
@@ -875,7 +879,7 @@
           <a:p>
             <a:fld id="{7C5C64AF-CB1E-4466-AA6C-9F57C4F9061D}" type="datetimeFigureOut">
               <a:rPr lang="pt-BR" smtClean="0"/>
-              <a:t>07/04/2025</a:t>
+              <a:t>28/04/2025</a:t>
             </a:fld>
             <a:endParaRPr lang="pt-BR" dirty="0"/>
           </a:p>
@@ -1150,7 +1154,7 @@
           <a:p>
             <a:fld id="{7C5C64AF-CB1E-4466-AA6C-9F57C4F9061D}" type="datetimeFigureOut">
               <a:rPr lang="pt-BR" smtClean="0"/>
-              <a:t>07/04/2025</a:t>
+              <a:t>28/04/2025</a:t>
             </a:fld>
             <a:endParaRPr lang="pt-BR" dirty="0"/>
           </a:p>
@@ -1415,7 +1419,7 @@
           <a:p>
             <a:fld id="{7C5C64AF-CB1E-4466-AA6C-9F57C4F9061D}" type="datetimeFigureOut">
               <a:rPr lang="pt-BR" smtClean="0"/>
-              <a:t>07/04/2025</a:t>
+              <a:t>28/04/2025</a:t>
             </a:fld>
             <a:endParaRPr lang="pt-BR" dirty="0"/>
           </a:p>
@@ -1827,7 +1831,7 @@
           <a:p>
             <a:fld id="{7C5C64AF-CB1E-4466-AA6C-9F57C4F9061D}" type="datetimeFigureOut">
               <a:rPr lang="pt-BR" smtClean="0"/>
-              <a:t>07/04/2025</a:t>
+              <a:t>28/04/2025</a:t>
             </a:fld>
             <a:endParaRPr lang="pt-BR" dirty="0"/>
           </a:p>
@@ -1968,7 +1972,7 @@
           <a:p>
             <a:fld id="{7C5C64AF-CB1E-4466-AA6C-9F57C4F9061D}" type="datetimeFigureOut">
               <a:rPr lang="pt-BR" smtClean="0"/>
-              <a:t>07/04/2025</a:t>
+              <a:t>28/04/2025</a:t>
             </a:fld>
             <a:endParaRPr lang="pt-BR" dirty="0"/>
           </a:p>
@@ -2081,7 +2085,7 @@
           <a:p>
             <a:fld id="{7C5C64AF-CB1E-4466-AA6C-9F57C4F9061D}" type="datetimeFigureOut">
               <a:rPr lang="pt-BR" smtClean="0"/>
-              <a:t>07/04/2025</a:t>
+              <a:t>28/04/2025</a:t>
             </a:fld>
             <a:endParaRPr lang="pt-BR" dirty="0"/>
           </a:p>
@@ -2392,7 +2396,7 @@
           <a:p>
             <a:fld id="{7C5C64AF-CB1E-4466-AA6C-9F57C4F9061D}" type="datetimeFigureOut">
               <a:rPr lang="pt-BR" smtClean="0"/>
-              <a:t>07/04/2025</a:t>
+              <a:t>28/04/2025</a:t>
             </a:fld>
             <a:endParaRPr lang="pt-BR" dirty="0"/>
           </a:p>
@@ -2680,7 +2684,7 @@
           <a:p>
             <a:fld id="{7C5C64AF-CB1E-4466-AA6C-9F57C4F9061D}" type="datetimeFigureOut">
               <a:rPr lang="pt-BR" smtClean="0"/>
-              <a:t>07/04/2025</a:t>
+              <a:t>28/04/2025</a:t>
             </a:fld>
             <a:endParaRPr lang="pt-BR" dirty="0"/>
           </a:p>
@@ -2921,7 +2925,7 @@
           <a:p>
             <a:fld id="{7C5C64AF-CB1E-4466-AA6C-9F57C4F9061D}" type="datetimeFigureOut">
               <a:rPr lang="pt-BR" smtClean="0"/>
-              <a:t>07/04/2025</a:t>
+              <a:t>28/04/2025</a:t>
             </a:fld>
             <a:endParaRPr lang="pt-BR" dirty="0"/>
           </a:p>
@@ -4396,7 +4400,7 @@
         <p:spPr>
           <a:xfrm>
             <a:off x="371094" y="2718054"/>
-            <a:ext cx="3438144" cy="3207258"/>
+            <a:ext cx="5724906" cy="3207258"/>
           </a:xfrm>
         </p:spPr>
         <p:txBody>
@@ -4412,7 +4416,7 @@
                   <a:schemeClr val="bg1"/>
                 </a:solidFill>
               </a:rPr>
-              <a:t>A </a:t>
+              <a:t>As </a:t>
             </a:r>
             <a:r>
               <a:rPr lang="en-US" sz="1700" noProof="0" dirty="0" err="1">
@@ -4420,7 +4424,7 @@
                   <a:schemeClr val="bg1"/>
                 </a:solidFill>
               </a:rPr>
-              <a:t>variável</a:t>
+              <a:t>técnicas</a:t>
             </a:r>
             <a:r>
               <a:rPr lang="en-US" sz="1700" noProof="0" dirty="0">
@@ -4436,7 +4440,7 @@
                   <a:schemeClr val="bg1"/>
                 </a:solidFill>
               </a:rPr>
-              <a:t>objetivo</a:t>
+              <a:t>utilizadas</a:t>
             </a:r>
             <a:r>
               <a:rPr lang="en-US" sz="1700" noProof="0" dirty="0">
@@ -4444,7 +4448,7 @@
                   <a:schemeClr val="bg1"/>
                 </a:solidFill>
               </a:rPr>
-              <a:t> do </a:t>
+              <a:t> </a:t>
             </a:r>
             <a:r>
               <a:rPr lang="en-US" sz="1700" noProof="0" dirty="0" err="1">
@@ -4452,7 +4456,7 @@
                   <a:schemeClr val="bg1"/>
                 </a:solidFill>
               </a:rPr>
-              <a:t>projeto</a:t>
+              <a:t>durante</a:t>
             </a:r>
             <a:r>
               <a:rPr lang="en-US" sz="1700" noProof="0" dirty="0">
@@ -4460,7 +4464,7 @@
                   <a:schemeClr val="bg1"/>
                 </a:solidFill>
               </a:rPr>
-              <a:t> é </a:t>
+              <a:t> o </a:t>
             </a:r>
             <a:r>
               <a:rPr lang="en-US" sz="1700" noProof="0" dirty="0" err="1">
@@ -4468,7 +4472,7 @@
                   <a:schemeClr val="bg1"/>
                 </a:solidFill>
               </a:rPr>
-              <a:t>Sentenças</a:t>
+              <a:t>processo</a:t>
             </a:r>
             <a:r>
               <a:rPr lang="en-US" sz="1700" noProof="0" dirty="0">
@@ -4476,9 +4480,227 @@
                   <a:schemeClr val="bg1"/>
                 </a:solidFill>
               </a:rPr>
-              <a:t>.</a:t>
-            </a:r>
-            <a:endParaRPr lang="pt-BR" sz="1700" noProof="0" dirty="0">
+              <a:t> de Análise </a:t>
+            </a:r>
+            <a:r>
+              <a:rPr lang="en-US" sz="1700" noProof="0" dirty="0" err="1">
+                <a:solidFill>
+                  <a:schemeClr val="bg1"/>
+                </a:solidFill>
+              </a:rPr>
+              <a:t>foram</a:t>
+            </a:r>
+            <a:r>
+              <a:rPr lang="en-US" sz="1700" noProof="0" dirty="0">
+                <a:solidFill>
+                  <a:schemeClr val="bg1"/>
+                </a:solidFill>
+              </a:rPr>
+              <a:t>:</a:t>
+            </a:r>
+          </a:p>
+          <a:p>
+            <a:pPr lvl="1" algn="just"/>
+            <a:r>
+              <a:rPr lang="en-US" sz="1300" dirty="0" err="1">
+                <a:solidFill>
+                  <a:schemeClr val="bg1"/>
+                </a:solidFill>
+              </a:rPr>
+              <a:t>Tabela</a:t>
+            </a:r>
+            <a:r>
+              <a:rPr lang="en-US" sz="1300" dirty="0">
+                <a:solidFill>
+                  <a:schemeClr val="bg1"/>
+                </a:solidFill>
+              </a:rPr>
+              <a:t> </a:t>
+            </a:r>
+            <a:r>
+              <a:rPr lang="en-US" sz="1300" dirty="0" err="1">
+                <a:solidFill>
+                  <a:schemeClr val="bg1"/>
+                </a:solidFill>
+              </a:rPr>
+              <a:t>dinâmica</a:t>
+            </a:r>
+            <a:r>
+              <a:rPr lang="en-US" sz="1300" dirty="0">
+                <a:solidFill>
+                  <a:schemeClr val="bg1"/>
+                </a:solidFill>
+              </a:rPr>
+              <a:t>;</a:t>
+            </a:r>
+          </a:p>
+          <a:p>
+            <a:pPr lvl="1" algn="just"/>
+            <a:r>
+              <a:rPr lang="en-US" sz="1300" noProof="0" dirty="0" err="1">
+                <a:solidFill>
+                  <a:schemeClr val="bg1"/>
+                </a:solidFill>
+              </a:rPr>
+              <a:t>Tabela</a:t>
+            </a:r>
+            <a:r>
+              <a:rPr lang="en-US" sz="1300" noProof="0" dirty="0">
+                <a:solidFill>
+                  <a:schemeClr val="bg1"/>
+                </a:solidFill>
+              </a:rPr>
+              <a:t> </a:t>
+            </a:r>
+            <a:r>
+              <a:rPr lang="en-US" sz="1300" noProof="0" dirty="0" err="1">
+                <a:solidFill>
+                  <a:schemeClr val="bg1"/>
+                </a:solidFill>
+              </a:rPr>
+              <a:t>resumo</a:t>
+            </a:r>
+            <a:r>
+              <a:rPr lang="en-US" sz="1300" noProof="0" dirty="0">
+                <a:solidFill>
+                  <a:schemeClr val="bg1"/>
+                </a:solidFill>
+              </a:rPr>
+              <a:t> com dados </a:t>
+            </a:r>
+            <a:r>
+              <a:rPr lang="en-US" sz="1300" noProof="0" dirty="0" err="1">
+                <a:solidFill>
+                  <a:schemeClr val="bg1"/>
+                </a:solidFill>
+              </a:rPr>
+              <a:t>estatísticos</a:t>
+            </a:r>
+            <a:r>
+              <a:rPr lang="en-US" sz="1300" noProof="0" dirty="0">
+                <a:solidFill>
+                  <a:schemeClr val="bg1"/>
+                </a:solidFill>
+              </a:rPr>
+              <a:t> (</a:t>
+            </a:r>
+            <a:r>
+              <a:rPr lang="en-US" sz="1300" noProof="0" dirty="0" err="1">
+                <a:solidFill>
+                  <a:schemeClr val="bg1"/>
+                </a:solidFill>
+              </a:rPr>
+              <a:t>medidas</a:t>
+            </a:r>
+            <a:r>
+              <a:rPr lang="en-US" sz="1300" noProof="0" dirty="0">
+                <a:solidFill>
+                  <a:schemeClr val="bg1"/>
+                </a:solidFill>
+              </a:rPr>
+              <a:t> de </a:t>
+            </a:r>
+            <a:r>
+              <a:rPr lang="en-US" sz="1300" noProof="0" dirty="0" err="1">
+                <a:solidFill>
+                  <a:schemeClr val="bg1"/>
+                </a:solidFill>
+              </a:rPr>
+              <a:t>posição</a:t>
+            </a:r>
+            <a:r>
+              <a:rPr lang="en-US" sz="1300" noProof="0" dirty="0">
+                <a:solidFill>
+                  <a:schemeClr val="bg1"/>
+                </a:solidFill>
+              </a:rPr>
+              <a:t> e </a:t>
+            </a:r>
+            <a:r>
+              <a:rPr lang="en-US" sz="1300" noProof="0" dirty="0" err="1">
+                <a:solidFill>
+                  <a:schemeClr val="bg1"/>
+                </a:solidFill>
+              </a:rPr>
+              <a:t>disperção</a:t>
+            </a:r>
+            <a:r>
+              <a:rPr lang="en-US" sz="1300" noProof="0" dirty="0">
+                <a:solidFill>
+                  <a:schemeClr val="bg1"/>
+                </a:solidFill>
+              </a:rPr>
+              <a:t>);</a:t>
+            </a:r>
+          </a:p>
+          <a:p>
+            <a:pPr lvl="1" algn="just"/>
+            <a:r>
+              <a:rPr lang="pt-BR" sz="1300" noProof="0" dirty="0" err="1">
+                <a:solidFill>
+                  <a:schemeClr val="bg1"/>
+                </a:solidFill>
+              </a:rPr>
+              <a:t>Information</a:t>
+            </a:r>
+            <a:r>
+              <a:rPr lang="pt-BR" sz="1300" noProof="0" dirty="0">
+                <a:solidFill>
+                  <a:schemeClr val="bg1"/>
+                </a:solidFill>
+              </a:rPr>
+              <a:t> </a:t>
+            </a:r>
+            <a:r>
+              <a:rPr lang="pt-BR" sz="1300" noProof="0" dirty="0" err="1">
+                <a:solidFill>
+                  <a:schemeClr val="bg1"/>
+                </a:solidFill>
+              </a:rPr>
+              <a:t>Value</a:t>
+            </a:r>
+            <a:r>
+              <a:rPr lang="pt-BR" sz="1300" noProof="0" dirty="0">
+                <a:solidFill>
+                  <a:schemeClr val="bg1"/>
+                </a:solidFill>
+              </a:rPr>
+              <a:t> (IV);</a:t>
+            </a:r>
+          </a:p>
+          <a:p>
+            <a:pPr lvl="1" algn="just"/>
+            <a:r>
+              <a:rPr lang="pt-BR" sz="1300" dirty="0">
+                <a:solidFill>
+                  <a:schemeClr val="bg1"/>
+                </a:solidFill>
+              </a:rPr>
+              <a:t>Correlação de Person;</a:t>
+            </a:r>
+          </a:p>
+          <a:p>
+            <a:pPr lvl="1" algn="just"/>
+            <a:r>
+              <a:rPr lang="pt-BR" sz="1300" noProof="0" dirty="0">
+                <a:solidFill>
+                  <a:schemeClr val="bg1"/>
+                </a:solidFill>
+              </a:rPr>
+              <a:t>R² e</a:t>
+            </a:r>
+          </a:p>
+          <a:p>
+            <a:pPr lvl="1" algn="just"/>
+            <a:r>
+              <a:rPr lang="pt-BR" sz="1300" dirty="0">
+                <a:solidFill>
+                  <a:schemeClr val="bg1"/>
+                </a:solidFill>
+              </a:rPr>
+              <a:t>Gráficos.</a:t>
+            </a:r>
+            <a:endParaRPr lang="pt-BR" sz="1300" noProof="0" dirty="0">
               <a:solidFill>
                 <a:schemeClr val="bg1"/>
               </a:solidFill>
@@ -4515,7 +4737,7 @@
         <p:cNvPr id="1" name="">
           <a:extLst>
             <a:ext uri="{FF2B5EF4-FFF2-40B4-BE49-F238E27FC236}">
-              <a16:creationId xmlns:a16="http://schemas.microsoft.com/office/drawing/2014/main" id="{46528EB8-1DB7-BC56-3935-900672059847}"/>
+              <a16:creationId xmlns:a16="http://schemas.microsoft.com/office/drawing/2014/main" id="{3D68DE61-E620-F694-C2B4-6373D4855D8A}"/>
             </a:ext>
           </a:extLst>
         </p:cNvPr>
@@ -4535,7 +4757,7 @@
           <p:cNvPr id="19" name="Rectangle 11">
             <a:extLst>
               <a:ext uri="{FF2B5EF4-FFF2-40B4-BE49-F238E27FC236}">
-                <a16:creationId xmlns:a16="http://schemas.microsoft.com/office/drawing/2014/main" id="{DFB401F8-F463-A41A-EC16-0B8FE4869428}"/>
+                <a16:creationId xmlns:a16="http://schemas.microsoft.com/office/drawing/2014/main" id="{8C64CAB1-6405-D607-5A56-1DE726E7630D}"/>
               </a:ext>
               <a:ext uri="{C183D7F6-B498-43B3-948B-1728B52AA6E4}">
                 <adec:decorative xmlns:adec="http://schemas.microsoft.com/office/drawing/2017/decorative" val="1"/>
@@ -4595,7 +4817,7 @@
           <p:cNvPr id="5" name="Espaço Reservado para Conteúdo 4" descr="Uma imagem contendo no interior, mesa, vivendo, quarto&#10;&#10;O conteúdo gerado por IA pode estar incorreto.">
             <a:extLst>
               <a:ext uri="{FF2B5EF4-FFF2-40B4-BE49-F238E27FC236}">
-                <a16:creationId xmlns:a16="http://schemas.microsoft.com/office/drawing/2014/main" id="{18BF3E7A-078F-26C5-5AA3-550ACBBB1693}"/>
+                <a16:creationId xmlns:a16="http://schemas.microsoft.com/office/drawing/2014/main" id="{8CA49734-E57C-BE37-F54B-743CC00DFD65}"/>
               </a:ext>
             </a:extLst>
           </p:cNvPr>
@@ -4630,7 +4852,7 @@
           <p:cNvPr id="20" name="Rectangle 13">
             <a:extLst>
               <a:ext uri="{FF2B5EF4-FFF2-40B4-BE49-F238E27FC236}">
-                <a16:creationId xmlns:a16="http://schemas.microsoft.com/office/drawing/2014/main" id="{A23008DF-303A-52D1-0E11-3050109D4C59}"/>
+                <a16:creationId xmlns:a16="http://schemas.microsoft.com/office/drawing/2014/main" id="{3DF36BF4-0CE1-3030-52EC-5984E12F19E4}"/>
               </a:ext>
               <a:ext uri="{C183D7F6-B498-43B3-948B-1728B52AA6E4}">
                 <adec:decorative xmlns:adec="http://schemas.microsoft.com/office/drawing/2017/decorative" val="1"/>
@@ -4716,7 +4938,7 @@
           <p:cNvPr id="2" name="Título 1">
             <a:extLst>
               <a:ext uri="{FF2B5EF4-FFF2-40B4-BE49-F238E27FC236}">
-                <a16:creationId xmlns:a16="http://schemas.microsoft.com/office/drawing/2014/main" id="{E87CB09B-5A56-B5C9-FE42-D31C62A7EC68}"/>
+                <a16:creationId xmlns:a16="http://schemas.microsoft.com/office/drawing/2014/main" id="{81E42588-558D-14F8-BB31-8A3EF469ED05}"/>
               </a:ext>
             </a:extLst>
           </p:cNvPr>
@@ -4745,7 +4967,7 @@
                   <a:schemeClr val="bg1"/>
                 </a:solidFill>
               </a:rPr>
-              <a:t>Resultados obtidos</a:t>
+              <a:t>Análise exploratória</a:t>
             </a:r>
           </a:p>
         </p:txBody>
@@ -4755,7 +4977,7 @@
           <p:cNvPr id="21" name="Rectangle 15">
             <a:extLst>
               <a:ext uri="{FF2B5EF4-FFF2-40B4-BE49-F238E27FC236}">
-                <a16:creationId xmlns:a16="http://schemas.microsoft.com/office/drawing/2014/main" id="{03908EBC-B60D-FE2D-A06C-61D2CC99BC3E}"/>
+                <a16:creationId xmlns:a16="http://schemas.microsoft.com/office/drawing/2014/main" id="{3E18B645-E199-8E5F-2485-EB02805CDE1F}"/>
               </a:ext>
               <a:ext uri="{C183D7F6-B498-43B3-948B-1728B52AA6E4}">
                 <adec:decorative xmlns:adec="http://schemas.microsoft.com/office/drawing/2017/decorative" val="1"/>
@@ -4823,7 +5045,7 @@
           <p:cNvPr id="18" name="Rectangle 17">
             <a:extLst>
               <a:ext uri="{FF2B5EF4-FFF2-40B4-BE49-F238E27FC236}">
-                <a16:creationId xmlns:a16="http://schemas.microsoft.com/office/drawing/2014/main" id="{ADFA94BB-F1A1-AFDD-03CB-D35720D80E85}"/>
+                <a16:creationId xmlns:a16="http://schemas.microsoft.com/office/drawing/2014/main" id="{F1036455-3C5F-4905-26A9-70170F6E17E2}"/>
               </a:ext>
               <a:ext uri="{C183D7F6-B498-43B3-948B-1728B52AA6E4}">
                 <adec:decorative xmlns:adec="http://schemas.microsoft.com/office/drawing/2017/decorative" val="1"/>
@@ -4918,7 +5140,7 @@
           <p:cNvPr id="9" name="Content Placeholder 8">
             <a:extLst>
               <a:ext uri="{FF2B5EF4-FFF2-40B4-BE49-F238E27FC236}">
-                <a16:creationId xmlns:a16="http://schemas.microsoft.com/office/drawing/2014/main" id="{C9C1CA76-2103-4930-322F-438A6C1523F0}"/>
+                <a16:creationId xmlns:a16="http://schemas.microsoft.com/office/drawing/2014/main" id="{FD000F65-E492-4C61-034C-BDBFFD981629}"/>
               </a:ext>
             </a:extLst>
           </p:cNvPr>
@@ -4932,7 +5154,7 @@
         <p:spPr>
           <a:xfrm>
             <a:off x="371093" y="2718053"/>
-            <a:ext cx="4382061" cy="3743131"/>
+            <a:ext cx="5724907" cy="3743131"/>
           </a:xfrm>
         </p:spPr>
         <p:txBody>
@@ -4942,14 +5164,1156 @@
           <a:lstStyle/>
           <a:p>
             <a:pPr algn="just"/>
-            <a:endParaRPr lang="pt-BR" sz="1700" b="1" noProof="0" dirty="0">
+            <a:r>
+              <a:rPr lang="pt-BR" sz="1700" b="1" noProof="0" dirty="0">
+                <a:solidFill>
+                  <a:schemeClr val="bg1"/>
+                </a:solidFill>
+              </a:rPr>
+              <a:t>Durante a Análise Exploratória dos Dados (AED) foi possível perceber algumas informações importantes, tais como:</a:t>
+            </a:r>
+          </a:p>
+          <a:p>
+            <a:pPr lvl="1" algn="just"/>
+            <a:r>
+              <a:rPr lang="pt-BR" sz="1300" b="1" noProof="0" dirty="0">
+                <a:solidFill>
+                  <a:schemeClr val="bg1"/>
+                </a:solidFill>
+              </a:rPr>
+              <a:t>44,44% das sentenças foram julgadas como improcedente</a:t>
+            </a:r>
+            <a:r>
+              <a:rPr lang="pt-BR" sz="1300" b="1" dirty="0">
+                <a:solidFill>
+                  <a:schemeClr val="bg1"/>
+                </a:solidFill>
+              </a:rPr>
+              <a:t>;</a:t>
+            </a:r>
+          </a:p>
+          <a:p>
+            <a:pPr lvl="1" algn="just"/>
+            <a:r>
+              <a:rPr lang="pt-BR" sz="1300" b="1" noProof="0" dirty="0">
+                <a:solidFill>
+                  <a:schemeClr val="bg1"/>
+                </a:solidFill>
+              </a:rPr>
+              <a:t>A comarca centro possui 21,11% dos casos;</a:t>
+            </a:r>
+          </a:p>
+          <a:p>
+            <a:pPr lvl="1" algn="just"/>
+            <a:r>
+              <a:rPr lang="pt-BR" sz="1300" b="1" noProof="0" dirty="0">
+                <a:solidFill>
+                  <a:schemeClr val="bg1"/>
+                </a:solidFill>
+              </a:rPr>
+              <a:t>As estratégias A e C juntas possuem 70% dos casos;</a:t>
+            </a:r>
+          </a:p>
+          <a:p>
+            <a:pPr lvl="1" algn="just"/>
+            <a:r>
+              <a:rPr lang="pt-BR" sz="1300" b="1" noProof="0" dirty="0">
+                <a:solidFill>
+                  <a:schemeClr val="bg1"/>
+                </a:solidFill>
+              </a:rPr>
+              <a:t>78,44% dos casos possuem uma taxa que varia entre 2,3 e 4,3;</a:t>
+            </a:r>
+          </a:p>
+          <a:p>
+            <a:pPr lvl="1" algn="just"/>
+            <a:r>
+              <a:rPr lang="pt-BR" sz="1300" b="1" noProof="0" dirty="0">
+                <a:solidFill>
+                  <a:schemeClr val="bg1"/>
+                </a:solidFill>
+              </a:rPr>
+              <a:t>As indenizações possuem um valor médio de R$ 1.694,57;</a:t>
+            </a:r>
+          </a:p>
+          <a:p>
+            <a:pPr lvl="1" algn="just"/>
+            <a:r>
+              <a:rPr lang="pt-BR" sz="1300" b="1" noProof="0" dirty="0">
+                <a:solidFill>
+                  <a:schemeClr val="bg1"/>
+                </a:solidFill>
+              </a:rPr>
+              <a:t>As comarcas Oeste (45,24%), Leste (47,19%) e Sul (49,46%) possuem uma taxa de ganho acima da média (44,44%);</a:t>
+            </a:r>
+          </a:p>
+          <a:p>
+            <a:pPr lvl="1" algn="just"/>
+            <a:r>
+              <a:rPr lang="pt-BR" sz="1300" b="1" noProof="0" dirty="0">
+                <a:solidFill>
+                  <a:schemeClr val="bg1"/>
+                </a:solidFill>
+              </a:rPr>
+              <a:t>A estratégia B (53,33%) possuem uma taxa de ganho acima da média (44,44%);</a:t>
+            </a:r>
+          </a:p>
+          <a:p>
+            <a:pPr lvl="1" algn="just"/>
+            <a:r>
+              <a:rPr lang="pt-BR" sz="1300" b="1" noProof="0" dirty="0">
+                <a:solidFill>
+                  <a:schemeClr val="bg1"/>
+                </a:solidFill>
+              </a:rPr>
+              <a:t>A faixa entre 0,3 e 1,3 de taxa contratada possuem uma taxa de ganho de 75% e</a:t>
+            </a:r>
+          </a:p>
+          <a:p>
+            <a:pPr lvl="1" algn="just"/>
+            <a:r>
+              <a:rPr lang="pt-BR" sz="1300" b="1" noProof="0" dirty="0">
+                <a:solidFill>
+                  <a:schemeClr val="bg1"/>
+                </a:solidFill>
+              </a:rPr>
+              <a:t>A correlação entre as variáveis valor de indenização e taxa contratada é considerada como Fraca (0,28).</a:t>
+            </a:r>
+          </a:p>
+        </p:txBody>
+      </p:sp>
+    </p:spTree>
+    <p:extLst>
+      <p:ext uri="{BB962C8B-B14F-4D97-AF65-F5344CB8AC3E}">
+        <p14:creationId xmlns:p14="http://schemas.microsoft.com/office/powerpoint/2010/main" val="3250421464"/>
+      </p:ext>
+    </p:extLst>
+  </p:cSld>
+  <p:clrMapOvr>
+    <a:masterClrMapping/>
+  </p:clrMapOvr>
+</p:sld>
+</file>
+
+<file path=ppt/slides/slide12.xml><?xml version="1.0" encoding="utf-8"?>
+<p:sld xmlns:a="http://schemas.openxmlformats.org/drawingml/2006/main" xmlns:r="http://schemas.openxmlformats.org/officeDocument/2006/relationships" xmlns:p="http://schemas.openxmlformats.org/presentationml/2006/main">
+  <p:cSld>
+    <p:bg>
+      <p:bgPr>
+        <a:solidFill>
+          <a:schemeClr val="bg1"/>
+        </a:solidFill>
+        <a:effectLst/>
+      </p:bgPr>
+    </p:bg>
+    <p:spTree>
+      <p:nvGrpSpPr>
+        <p:cNvPr id="1" name="">
+          <a:extLst>
+            <a:ext uri="{FF2B5EF4-FFF2-40B4-BE49-F238E27FC236}">
+              <a16:creationId xmlns:a16="http://schemas.microsoft.com/office/drawing/2014/main" id="{2EFCAB0A-1F09-ACC8-C046-650DC5253280}"/>
+            </a:ext>
+          </a:extLst>
+        </p:cNvPr>
+        <p:cNvGrpSpPr/>
+        <p:nvPr/>
+      </p:nvGrpSpPr>
+      <p:grpSpPr>
+        <a:xfrm>
+          <a:off x="0" y="0"/>
+          <a:ext cx="0" cy="0"/>
+          <a:chOff x="0" y="0"/>
+          <a:chExt cx="0" cy="0"/>
+        </a:xfrm>
+      </p:grpSpPr>
+      <p:sp useBgFill="1">
+        <p:nvSpPr>
+          <p:cNvPr id="12" name="Rectangle 11">
+            <a:extLst>
+              <a:ext uri="{FF2B5EF4-FFF2-40B4-BE49-F238E27FC236}">
+                <a16:creationId xmlns:a16="http://schemas.microsoft.com/office/drawing/2014/main" id="{07CFAF25-FFBE-578F-3B4E-3457A45AFC8D}"/>
+              </a:ext>
+              <a:ext uri="{C183D7F6-B498-43B3-948B-1728B52AA6E4}">
+                <adec:decorative xmlns:adec="http://schemas.microsoft.com/office/drawing/2017/decorative" val="1"/>
+              </a:ext>
+            </a:extLst>
+          </p:cNvPr>
+          <p:cNvSpPr>
+            <a:spLocks noGrp="1" noRot="1" noChangeAspect="1" noMove="1" noResize="1" noEditPoints="1" noAdjustHandles="1" noChangeArrowheads="1" noChangeShapeType="1" noTextEdit="1"/>
+          </p:cNvSpPr>
+          <p:nvPr>
+            <p:extLst>
+              <p:ext uri="{386F3935-93C4-4BCD-93E2-E3B085C9AB24}">
+                <p16:designElem xmlns:p16="http://schemas.microsoft.com/office/powerpoint/2015/main" val="1"/>
+              </p:ext>
+            </p:extLst>
+          </p:nvPr>
+        </p:nvSpPr>
+        <p:spPr>
+          <a:xfrm>
+            <a:off x="0" y="0"/>
+            <a:ext cx="12192000" cy="6858000"/>
+          </a:xfrm>
+          <a:prstGeom prst="rect">
+            <a:avLst/>
+          </a:prstGeom>
+          <a:ln>
+            <a:noFill/>
+          </a:ln>
+        </p:spPr>
+        <p:style>
+          <a:lnRef idx="2">
+            <a:schemeClr val="accent1">
+              <a:shade val="50000"/>
+            </a:schemeClr>
+          </a:lnRef>
+          <a:fillRef idx="1">
+            <a:schemeClr val="accent1"/>
+          </a:fillRef>
+          <a:effectRef idx="0">
+            <a:schemeClr val="accent1"/>
+          </a:effectRef>
+          <a:fontRef idx="minor">
+            <a:schemeClr val="lt1"/>
+          </a:fontRef>
+        </p:style>
+        <p:txBody>
+          <a:bodyPr rtlCol="0" anchor="ctr"/>
+          <a:lstStyle/>
+          <a:p>
+            <a:pPr algn="ctr"/>
+            <a:endParaRPr lang="pt-BR" noProof="0" dirty="0"/>
+          </a:p>
+        </p:txBody>
+      </p:sp>
+      <p:pic>
+        <p:nvPicPr>
+          <p:cNvPr id="5" name="Espaço Reservado para Conteúdo 4" descr="Uma imagem contendo mesa, quarto, balcão, espelho&#10;&#10;O conteúdo gerado por IA pode estar incorreto.">
+            <a:extLst>
+              <a:ext uri="{FF2B5EF4-FFF2-40B4-BE49-F238E27FC236}">
+                <a16:creationId xmlns:a16="http://schemas.microsoft.com/office/drawing/2014/main" id="{F1982B3B-575D-F7FF-EFAB-25410A2222EB}"/>
+              </a:ext>
+            </a:extLst>
+          </p:cNvPr>
+          <p:cNvPicPr>
+            <a:picLocks noChangeAspect="1"/>
+          </p:cNvPicPr>
+          <p:nvPr/>
+        </p:nvPicPr>
+        <p:blipFill>
+          <a:blip r:embed="rId2">
+            <a:extLst>
+              <a:ext uri="{28A0092B-C50C-407E-A947-70E740481C1C}">
+                <a14:useLocalDpi xmlns:a14="http://schemas.microsoft.com/office/drawing/2010/main" val="0"/>
+              </a:ext>
+            </a:extLst>
+          </a:blip>
+          <a:srcRect t="28087" r="9090" b="-1"/>
+          <a:stretch/>
+        </p:blipFill>
+        <p:spPr>
+          <a:xfrm>
+            <a:off x="3522468" y="10"/>
+            <a:ext cx="8669532" cy="6857990"/>
+          </a:xfrm>
+          <a:prstGeom prst="rect">
+            <a:avLst/>
+          </a:prstGeom>
+        </p:spPr>
+      </p:pic>
+      <p:sp>
+        <p:nvSpPr>
+          <p:cNvPr id="14" name="Rectangle 13">
+            <a:extLst>
+              <a:ext uri="{FF2B5EF4-FFF2-40B4-BE49-F238E27FC236}">
+                <a16:creationId xmlns:a16="http://schemas.microsoft.com/office/drawing/2014/main" id="{74CFF875-4239-1CE8-4B50-47ACADBA2180}"/>
+              </a:ext>
+              <a:ext uri="{C183D7F6-B498-43B3-948B-1728B52AA6E4}">
+                <adec:decorative xmlns:adec="http://schemas.microsoft.com/office/drawing/2017/decorative" val="1"/>
+              </a:ext>
+            </a:extLst>
+          </p:cNvPr>
+          <p:cNvSpPr>
+            <a:spLocks noGrp="1" noRot="1" noChangeAspect="1" noMove="1" noResize="1" noEditPoints="1" noAdjustHandles="1" noChangeArrowheads="1" noChangeShapeType="1" noTextEdit="1"/>
+          </p:cNvSpPr>
+          <p:nvPr>
+            <p:extLst>
+              <p:ext uri="{386F3935-93C4-4BCD-93E2-E3B085C9AB24}">
+                <p16:designElem xmlns:p16="http://schemas.microsoft.com/office/powerpoint/2015/main" val="1"/>
+              </p:ext>
+            </p:extLst>
+          </p:nvPr>
+        </p:nvSpPr>
+        <p:spPr>
+          <a:xfrm>
+            <a:off x="2" y="0"/>
+            <a:ext cx="9756601" cy="6858000"/>
+          </a:xfrm>
+          <a:prstGeom prst="rect">
+            <a:avLst/>
+          </a:prstGeom>
+          <a:gradFill>
+            <a:gsLst>
+              <a:gs pos="58000">
+                <a:schemeClr val="tx1"/>
+              </a:gs>
+              <a:gs pos="35000">
+                <a:schemeClr val="tx1">
+                  <a:alpha val="78000"/>
+                </a:schemeClr>
+              </a:gs>
+              <a:gs pos="19000">
+                <a:schemeClr val="tx1">
+                  <a:alpha val="38000"/>
+                </a:schemeClr>
+              </a:gs>
+              <a:gs pos="0">
+                <a:schemeClr val="tx1">
+                  <a:alpha val="0"/>
+                </a:schemeClr>
+              </a:gs>
+              <a:gs pos="100000">
+                <a:schemeClr val="tx1"/>
+              </a:gs>
+            </a:gsLst>
+            <a:lin ang="10800000" scaled="0"/>
+          </a:gradFill>
+          <a:ln>
+            <a:noFill/>
+          </a:ln>
+        </p:spPr>
+        <p:style>
+          <a:lnRef idx="2">
+            <a:schemeClr val="accent1">
+              <a:shade val="50000"/>
+            </a:schemeClr>
+          </a:lnRef>
+          <a:fillRef idx="1">
+            <a:schemeClr val="accent1"/>
+          </a:fillRef>
+          <a:effectRef idx="0">
+            <a:schemeClr val="accent1"/>
+          </a:effectRef>
+          <a:fontRef idx="minor">
+            <a:schemeClr val="lt1"/>
+          </a:fontRef>
+        </p:style>
+        <p:txBody>
+          <a:bodyPr rtlCol="0" anchor="ctr"/>
+          <a:lstStyle/>
+          <a:p>
+            <a:pPr algn="ctr"/>
+            <a:endParaRPr lang="pt-BR" noProof="0" dirty="0"/>
+          </a:p>
+        </p:txBody>
+      </p:sp>
+      <p:sp>
+        <p:nvSpPr>
+          <p:cNvPr id="2" name="Título 1">
+            <a:extLst>
+              <a:ext uri="{FF2B5EF4-FFF2-40B4-BE49-F238E27FC236}">
+                <a16:creationId xmlns:a16="http://schemas.microsoft.com/office/drawing/2014/main" id="{BA9AA1AD-A605-ABC9-C2EE-7E93DB7D4896}"/>
+              </a:ext>
+            </a:extLst>
+          </p:cNvPr>
+          <p:cNvSpPr>
+            <a:spLocks noGrp="1"/>
+          </p:cNvSpPr>
+          <p:nvPr>
+            <p:ph type="title"/>
+          </p:nvPr>
+        </p:nvSpPr>
+        <p:spPr>
+          <a:xfrm>
+            <a:off x="371094" y="1161288"/>
+            <a:ext cx="3438144" cy="1124712"/>
+          </a:xfrm>
+        </p:spPr>
+        <p:txBody>
+          <a:bodyPr anchor="b">
+            <a:normAutofit/>
+          </a:bodyPr>
+          <a:lstStyle/>
+          <a:p>
+            <a:r>
+              <a:rPr lang="pt-BR" sz="2800" noProof="0" dirty="0">
+                <a:solidFill>
+                  <a:schemeClr val="bg1"/>
+                </a:solidFill>
+              </a:rPr>
+              <a:t>Análise exploratória</a:t>
+            </a:r>
+          </a:p>
+        </p:txBody>
+      </p:sp>
+      <p:sp>
+        <p:nvSpPr>
+          <p:cNvPr id="16" name="Rectangle 15">
+            <a:extLst>
+              <a:ext uri="{FF2B5EF4-FFF2-40B4-BE49-F238E27FC236}">
+                <a16:creationId xmlns:a16="http://schemas.microsoft.com/office/drawing/2014/main" id="{5820A295-A228-E01B-8B50-95658B7B5FFB}"/>
+              </a:ext>
+              <a:ext uri="{C183D7F6-B498-43B3-948B-1728B52AA6E4}">
+                <adec:decorative xmlns:adec="http://schemas.microsoft.com/office/drawing/2017/decorative" val="1"/>
+              </a:ext>
+            </a:extLst>
+          </p:cNvPr>
+          <p:cNvSpPr>
+            <a:spLocks noGrp="1" noRot="1" noChangeAspect="1" noMove="1" noResize="1" noEditPoints="1" noAdjustHandles="1" noChangeArrowheads="1" noChangeShapeType="1" noTextEdit="1"/>
+          </p:cNvSpPr>
+          <p:nvPr>
+            <p:extLst>
+              <p:ext uri="{386F3935-93C4-4BCD-93E2-E3B085C9AB24}">
+                <p16:designElem xmlns:p16="http://schemas.microsoft.com/office/powerpoint/2015/main" val="1"/>
+              </p:ext>
+            </p:extLst>
+          </p:nvPr>
+        </p:nvSpPr>
+        <p:spPr>
+          <a:xfrm rot="5400000">
+            <a:off x="662559" y="605790"/>
+            <a:ext cx="73152" cy="548640"/>
+          </a:xfrm>
+          <a:prstGeom prst="rect">
+            <a:avLst/>
+          </a:prstGeom>
+          <a:solidFill>
+            <a:schemeClr val="accent2"/>
+          </a:solidFill>
+          <a:ln>
+            <a:noFill/>
+          </a:ln>
+        </p:spPr>
+        <p:style>
+          <a:lnRef idx="2">
+            <a:schemeClr val="accent1">
+              <a:shade val="50000"/>
+            </a:schemeClr>
+          </a:lnRef>
+          <a:fillRef idx="1">
+            <a:schemeClr val="accent1"/>
+          </a:fillRef>
+          <a:effectRef idx="0">
+            <a:schemeClr val="accent1"/>
+          </a:effectRef>
+          <a:fontRef idx="minor">
+            <a:schemeClr val="lt1"/>
+          </a:fontRef>
+        </p:style>
+        <p:txBody>
+          <a:bodyPr rtlCol="0" anchor="ctr"/>
+          <a:lstStyle/>
+          <a:p>
+            <a:pPr algn="ctr"/>
+            <a:endParaRPr lang="pt-BR" noProof="0" dirty="0">
               <a:solidFill>
-                <a:schemeClr val="bg1"/>
+                <a:prstClr val="white"/>
               </a:solidFill>
+              <a:latin typeface="Calibri" panose="020F0502020204030204"/>
             </a:endParaRPr>
           </a:p>
         </p:txBody>
       </p:sp>
+      <p:sp>
+        <p:nvSpPr>
+          <p:cNvPr id="18" name="Rectangle 17">
+            <a:extLst>
+              <a:ext uri="{FF2B5EF4-FFF2-40B4-BE49-F238E27FC236}">
+                <a16:creationId xmlns:a16="http://schemas.microsoft.com/office/drawing/2014/main" id="{5862C0A6-6DA7-D7A9-F402-55C4142F2B2B}"/>
+              </a:ext>
+              <a:ext uri="{C183D7F6-B498-43B3-948B-1728B52AA6E4}">
+                <adec:decorative xmlns:adec="http://schemas.microsoft.com/office/drawing/2017/decorative" val="1"/>
+              </a:ext>
+            </a:extLst>
+          </p:cNvPr>
+          <p:cNvSpPr>
+            <a:spLocks noGrp="1" noRot="1" noChangeAspect="1" noMove="1" noResize="1" noEditPoints="1" noAdjustHandles="1" noChangeArrowheads="1" noChangeShapeType="1" noTextEdit="1"/>
+          </p:cNvSpPr>
+          <p:nvPr>
+            <p:extLst>
+              <p:ext uri="{386F3935-93C4-4BCD-93E2-E3B085C9AB24}">
+                <p16:designElem xmlns:p16="http://schemas.microsoft.com/office/powerpoint/2015/main" val="1"/>
+              </p:ext>
+            </p:extLst>
+          </p:nvPr>
+        </p:nvSpPr>
+        <p:spPr>
+          <a:xfrm>
+            <a:off x="428244" y="2443480"/>
+            <a:ext cx="3300984" cy="9144"/>
+          </a:xfrm>
+          <a:prstGeom prst="rect">
+            <a:avLst/>
+          </a:prstGeom>
+          <a:solidFill>
+            <a:schemeClr val="tx1"/>
+          </a:solidFill>
+          <a:ln w="3175">
+            <a:solidFill>
+              <a:schemeClr val="bg1"/>
+            </a:solidFill>
+          </a:ln>
+          <a:effectLst/>
+        </p:spPr>
+        <p:style>
+          <a:lnRef idx="2">
+            <a:schemeClr val="accent1">
+              <a:shade val="50000"/>
+            </a:schemeClr>
+          </a:lnRef>
+          <a:fillRef idx="1">
+            <a:schemeClr val="accent1"/>
+          </a:fillRef>
+          <a:effectRef idx="0">
+            <a:schemeClr val="accent1"/>
+          </a:effectRef>
+          <a:fontRef idx="minor">
+            <a:schemeClr val="lt1"/>
+          </a:fontRef>
+        </p:style>
+        <p:txBody>
+          <a:bodyPr rtlCol="0" anchor="ctr"/>
+          <a:lstStyle/>
+          <a:p>
+            <a:pPr marL="0" marR="0" lvl="0" indent="0" algn="ctr" defTabSz="914400" rtl="0" eaLnBrk="1" fontAlgn="auto" latinLnBrk="0" hangingPunct="1">
+              <a:lnSpc>
+                <a:spcPct val="100000"/>
+              </a:lnSpc>
+              <a:spcBef>
+                <a:spcPts val="0"/>
+              </a:spcBef>
+              <a:spcAft>
+                <a:spcPts val="0"/>
+              </a:spcAft>
+              <a:buClrTx/>
+              <a:buSzTx/>
+              <a:buFontTx/>
+              <a:buNone/>
+              <a:tabLst/>
+              <a:defRPr/>
+            </a:pPr>
+            <a:endParaRPr kumimoji="0" lang="pt-BR" sz="1800" b="0" i="0" u="none" strike="noStrike" kern="1200" cap="none" spc="0" normalizeH="0" baseline="0" noProof="0" dirty="0">
+              <a:ln>
+                <a:noFill/>
+              </a:ln>
+              <a:solidFill>
+                <a:prstClr val="white"/>
+              </a:solidFill>
+              <a:effectLst/>
+              <a:uLnTx/>
+              <a:uFillTx/>
+              <a:latin typeface="Calibri" panose="020F0502020204030204"/>
+              <a:ea typeface="+mn-ea"/>
+              <a:cs typeface="+mn-cs"/>
+            </a:endParaRPr>
+          </a:p>
+        </p:txBody>
+      </p:sp>
+      <p:pic>
+        <p:nvPicPr>
+          <p:cNvPr id="4" name="Espaço Reservado para Conteúdo 3">
+            <a:extLst>
+              <a:ext uri="{FF2B5EF4-FFF2-40B4-BE49-F238E27FC236}">
+                <a16:creationId xmlns:a16="http://schemas.microsoft.com/office/drawing/2014/main" id="{46CD3B9A-7559-FAC5-0593-10F3BFD2DEB1}"/>
+              </a:ext>
+            </a:extLst>
+          </p:cNvPr>
+          <p:cNvPicPr>
+            <a:picLocks noGrp="1" noChangeAspect="1"/>
+          </p:cNvPicPr>
+          <p:nvPr>
+            <p:ph idx="1"/>
+          </p:nvPr>
+        </p:nvPicPr>
+        <p:blipFill>
+          <a:blip r:embed="rId3"/>
+          <a:stretch>
+            <a:fillRect/>
+          </a:stretch>
+        </p:blipFill>
+        <p:spPr>
+          <a:xfrm>
+            <a:off x="371095" y="2610104"/>
+            <a:ext cx="5029042" cy="2811105"/>
+          </a:xfrm>
+        </p:spPr>
+      </p:pic>
+      <p:pic>
+        <p:nvPicPr>
+          <p:cNvPr id="7" name="Imagem 6">
+            <a:extLst>
+              <a:ext uri="{FF2B5EF4-FFF2-40B4-BE49-F238E27FC236}">
+                <a16:creationId xmlns:a16="http://schemas.microsoft.com/office/drawing/2014/main" id="{8294D403-FFB5-8991-1E5F-08798466C1B6}"/>
+              </a:ext>
+            </a:extLst>
+          </p:cNvPr>
+          <p:cNvPicPr>
+            <a:picLocks noChangeAspect="1"/>
+          </p:cNvPicPr>
+          <p:nvPr/>
+        </p:nvPicPr>
+        <p:blipFill>
+          <a:blip r:embed="rId4"/>
+          <a:stretch>
+            <a:fillRect/>
+          </a:stretch>
+        </p:blipFill>
+        <p:spPr>
+          <a:xfrm>
+            <a:off x="5519929" y="313890"/>
+            <a:ext cx="4982270" cy="3115110"/>
+          </a:xfrm>
+          <a:prstGeom prst="rect">
+            <a:avLst/>
+          </a:prstGeom>
+        </p:spPr>
+      </p:pic>
+      <p:pic>
+        <p:nvPicPr>
+          <p:cNvPr id="10" name="Imagem 9">
+            <a:extLst>
+              <a:ext uri="{FF2B5EF4-FFF2-40B4-BE49-F238E27FC236}">
+                <a16:creationId xmlns:a16="http://schemas.microsoft.com/office/drawing/2014/main" id="{AF50864A-F321-13D6-3E70-4FF1619ED4FD}"/>
+              </a:ext>
+            </a:extLst>
+          </p:cNvPr>
+          <p:cNvPicPr>
+            <a:picLocks noChangeAspect="1"/>
+          </p:cNvPicPr>
+          <p:nvPr/>
+        </p:nvPicPr>
+        <p:blipFill>
+          <a:blip r:embed="rId5"/>
+          <a:stretch>
+            <a:fillRect/>
+          </a:stretch>
+        </p:blipFill>
+        <p:spPr>
+          <a:xfrm>
+            <a:off x="5519929" y="3562129"/>
+            <a:ext cx="5611008" cy="3162741"/>
+          </a:xfrm>
+          <a:prstGeom prst="rect">
+            <a:avLst/>
+          </a:prstGeom>
+        </p:spPr>
+      </p:pic>
+    </p:spTree>
+    <p:extLst>
+      <p:ext uri="{BB962C8B-B14F-4D97-AF65-F5344CB8AC3E}">
+        <p14:creationId xmlns:p14="http://schemas.microsoft.com/office/powerpoint/2010/main" val="939034223"/>
+      </p:ext>
+    </p:extLst>
+  </p:cSld>
+  <p:clrMapOvr>
+    <a:masterClrMapping/>
+  </p:clrMapOvr>
+</p:sld>
+</file>
+
+<file path=ppt/slides/slide13.xml><?xml version="1.0" encoding="utf-8"?>
+<p:sld xmlns:a="http://schemas.openxmlformats.org/drawingml/2006/main" xmlns:r="http://schemas.openxmlformats.org/officeDocument/2006/relationships" xmlns:p="http://schemas.openxmlformats.org/presentationml/2006/main">
+  <p:cSld>
+    <p:bg>
+      <p:bgPr>
+        <a:solidFill>
+          <a:schemeClr val="bg1"/>
+        </a:solidFill>
+        <a:effectLst/>
+      </p:bgPr>
+    </p:bg>
+    <p:spTree>
+      <p:nvGrpSpPr>
+        <p:cNvPr id="1" name="">
+          <a:extLst>
+            <a:ext uri="{FF2B5EF4-FFF2-40B4-BE49-F238E27FC236}">
+              <a16:creationId xmlns:a16="http://schemas.microsoft.com/office/drawing/2014/main" id="{46528EB8-1DB7-BC56-3935-900672059847}"/>
+            </a:ext>
+          </a:extLst>
+        </p:cNvPr>
+        <p:cNvGrpSpPr/>
+        <p:nvPr/>
+      </p:nvGrpSpPr>
+      <p:grpSpPr>
+        <a:xfrm>
+          <a:off x="0" y="0"/>
+          <a:ext cx="0" cy="0"/>
+          <a:chOff x="0" y="0"/>
+          <a:chExt cx="0" cy="0"/>
+        </a:xfrm>
+      </p:grpSpPr>
+      <p:sp useBgFill="1">
+        <p:nvSpPr>
+          <p:cNvPr id="19" name="Rectangle 11">
+            <a:extLst>
+              <a:ext uri="{FF2B5EF4-FFF2-40B4-BE49-F238E27FC236}">
+                <a16:creationId xmlns:a16="http://schemas.microsoft.com/office/drawing/2014/main" id="{DFB401F8-F463-A41A-EC16-0B8FE4869428}"/>
+              </a:ext>
+              <a:ext uri="{C183D7F6-B498-43B3-948B-1728B52AA6E4}">
+                <adec:decorative xmlns:adec="http://schemas.microsoft.com/office/drawing/2017/decorative" val="1"/>
+              </a:ext>
+            </a:extLst>
+          </p:cNvPr>
+          <p:cNvSpPr>
+            <a:spLocks noGrp="1" noRot="1" noChangeAspect="1" noMove="1" noResize="1" noEditPoints="1" noAdjustHandles="1" noChangeArrowheads="1" noChangeShapeType="1" noTextEdit="1"/>
+          </p:cNvSpPr>
+          <p:nvPr>
+            <p:extLst>
+              <p:ext uri="{386F3935-93C4-4BCD-93E2-E3B085C9AB24}">
+                <p16:designElem xmlns:p16="http://schemas.microsoft.com/office/powerpoint/2015/main" val="1"/>
+              </p:ext>
+            </p:extLst>
+          </p:nvPr>
+        </p:nvSpPr>
+        <p:spPr>
+          <a:xfrm>
+            <a:off x="0" y="0"/>
+            <a:ext cx="12192000" cy="6858000"/>
+          </a:xfrm>
+          <a:prstGeom prst="rect">
+            <a:avLst/>
+          </a:prstGeom>
+          <a:ln>
+            <a:noFill/>
+          </a:ln>
+        </p:spPr>
+        <p:style>
+          <a:lnRef idx="2">
+            <a:schemeClr val="accent1">
+              <a:shade val="50000"/>
+            </a:schemeClr>
+          </a:lnRef>
+          <a:fillRef idx="1">
+            <a:schemeClr val="accent1"/>
+          </a:fillRef>
+          <a:effectRef idx="0">
+            <a:schemeClr val="accent1"/>
+          </a:effectRef>
+          <a:fontRef idx="minor">
+            <a:schemeClr val="lt1"/>
+          </a:fontRef>
+        </p:style>
+        <p:txBody>
+          <a:bodyPr rtlCol="0" anchor="ctr"/>
+          <a:lstStyle/>
+          <a:p>
+            <a:pPr algn="ctr"/>
+            <a:endParaRPr lang="pt-BR" noProof="0" dirty="0"/>
+          </a:p>
+        </p:txBody>
+      </p:sp>
+      <p:pic>
+        <p:nvPicPr>
+          <p:cNvPr id="5" name="Espaço Reservado para Conteúdo 4" descr="Uma imagem contendo no interior, mesa, vivendo, quarto&#10;&#10;O conteúdo gerado por IA pode estar incorreto.">
+            <a:extLst>
+              <a:ext uri="{FF2B5EF4-FFF2-40B4-BE49-F238E27FC236}">
+                <a16:creationId xmlns:a16="http://schemas.microsoft.com/office/drawing/2014/main" id="{18BF3E7A-078F-26C5-5AA3-550ACBBB1693}"/>
+              </a:ext>
+            </a:extLst>
+          </p:cNvPr>
+          <p:cNvPicPr>
+            <a:picLocks noChangeAspect="1"/>
+          </p:cNvPicPr>
+          <p:nvPr/>
+        </p:nvPicPr>
+        <p:blipFill>
+          <a:blip r:embed="rId2">
+            <a:extLst>
+              <a:ext uri="{28A0092B-C50C-407E-A947-70E740481C1C}">
+                <a14:useLocalDpi xmlns:a14="http://schemas.microsoft.com/office/drawing/2010/main" val="0"/>
+              </a:ext>
+            </a:extLst>
+          </a:blip>
+          <a:srcRect l="9091" t="28087" r="-1" b="-1"/>
+          <a:stretch/>
+        </p:blipFill>
+        <p:spPr>
+          <a:xfrm>
+            <a:off x="3522468" y="10"/>
+            <a:ext cx="8669532" cy="6857990"/>
+          </a:xfrm>
+          <a:prstGeom prst="rect">
+            <a:avLst/>
+          </a:prstGeom>
+        </p:spPr>
+      </p:pic>
+      <p:sp>
+        <p:nvSpPr>
+          <p:cNvPr id="20" name="Rectangle 13">
+            <a:extLst>
+              <a:ext uri="{FF2B5EF4-FFF2-40B4-BE49-F238E27FC236}">
+                <a16:creationId xmlns:a16="http://schemas.microsoft.com/office/drawing/2014/main" id="{A23008DF-303A-52D1-0E11-3050109D4C59}"/>
+              </a:ext>
+              <a:ext uri="{C183D7F6-B498-43B3-948B-1728B52AA6E4}">
+                <adec:decorative xmlns:adec="http://schemas.microsoft.com/office/drawing/2017/decorative" val="1"/>
+              </a:ext>
+            </a:extLst>
+          </p:cNvPr>
+          <p:cNvSpPr>
+            <a:spLocks noGrp="1" noRot="1" noChangeAspect="1" noMove="1" noResize="1" noEditPoints="1" noAdjustHandles="1" noChangeArrowheads="1" noChangeShapeType="1" noTextEdit="1"/>
+          </p:cNvSpPr>
+          <p:nvPr>
+            <p:extLst>
+              <p:ext uri="{386F3935-93C4-4BCD-93E2-E3B085C9AB24}">
+                <p16:designElem xmlns:p16="http://schemas.microsoft.com/office/powerpoint/2015/main" val="1"/>
+              </p:ext>
+            </p:extLst>
+          </p:nvPr>
+        </p:nvSpPr>
+        <p:spPr>
+          <a:xfrm>
+            <a:off x="2" y="0"/>
+            <a:ext cx="9756601" cy="6858000"/>
+          </a:xfrm>
+          <a:prstGeom prst="rect">
+            <a:avLst/>
+          </a:prstGeom>
+          <a:gradFill>
+            <a:gsLst>
+              <a:gs pos="58000">
+                <a:schemeClr val="tx1"/>
+              </a:gs>
+              <a:gs pos="35000">
+                <a:schemeClr val="tx1">
+                  <a:alpha val="78000"/>
+                </a:schemeClr>
+              </a:gs>
+              <a:gs pos="19000">
+                <a:schemeClr val="tx1">
+                  <a:alpha val="38000"/>
+                </a:schemeClr>
+              </a:gs>
+              <a:gs pos="0">
+                <a:schemeClr val="tx1">
+                  <a:alpha val="0"/>
+                </a:schemeClr>
+              </a:gs>
+              <a:gs pos="100000">
+                <a:schemeClr val="tx1"/>
+              </a:gs>
+            </a:gsLst>
+            <a:lin ang="10800000" scaled="0"/>
+          </a:gradFill>
+          <a:ln>
+            <a:noFill/>
+          </a:ln>
+        </p:spPr>
+        <p:style>
+          <a:lnRef idx="2">
+            <a:schemeClr val="accent1">
+              <a:shade val="50000"/>
+            </a:schemeClr>
+          </a:lnRef>
+          <a:fillRef idx="1">
+            <a:schemeClr val="accent1"/>
+          </a:fillRef>
+          <a:effectRef idx="0">
+            <a:schemeClr val="accent1"/>
+          </a:effectRef>
+          <a:fontRef idx="minor">
+            <a:schemeClr val="lt1"/>
+          </a:fontRef>
+        </p:style>
+        <p:txBody>
+          <a:bodyPr rtlCol="0" anchor="ctr"/>
+          <a:lstStyle/>
+          <a:p>
+            <a:pPr algn="ctr"/>
+            <a:endParaRPr lang="pt-BR" noProof="0" dirty="0"/>
+          </a:p>
+        </p:txBody>
+      </p:sp>
+      <p:sp>
+        <p:nvSpPr>
+          <p:cNvPr id="2" name="Título 1">
+            <a:extLst>
+              <a:ext uri="{FF2B5EF4-FFF2-40B4-BE49-F238E27FC236}">
+                <a16:creationId xmlns:a16="http://schemas.microsoft.com/office/drawing/2014/main" id="{E87CB09B-5A56-B5C9-FE42-D31C62A7EC68}"/>
+              </a:ext>
+            </a:extLst>
+          </p:cNvPr>
+          <p:cNvSpPr>
+            <a:spLocks noGrp="1"/>
+          </p:cNvSpPr>
+          <p:nvPr>
+            <p:ph type="title"/>
+          </p:nvPr>
+        </p:nvSpPr>
+        <p:spPr>
+          <a:xfrm>
+            <a:off x="371094" y="1161288"/>
+            <a:ext cx="3438144" cy="1124712"/>
+          </a:xfrm>
+        </p:spPr>
+        <p:txBody>
+          <a:bodyPr anchor="b">
+            <a:normAutofit/>
+          </a:bodyPr>
+          <a:lstStyle/>
+          <a:p>
+            <a:r>
+              <a:rPr lang="pt-BR" sz="2800" noProof="0" dirty="0">
+                <a:solidFill>
+                  <a:schemeClr val="bg1"/>
+                </a:solidFill>
+              </a:rPr>
+              <a:t>Análise exploratória</a:t>
+            </a:r>
+          </a:p>
+        </p:txBody>
+      </p:sp>
+      <p:sp>
+        <p:nvSpPr>
+          <p:cNvPr id="21" name="Rectangle 15">
+            <a:extLst>
+              <a:ext uri="{FF2B5EF4-FFF2-40B4-BE49-F238E27FC236}">
+                <a16:creationId xmlns:a16="http://schemas.microsoft.com/office/drawing/2014/main" id="{03908EBC-B60D-FE2D-A06C-61D2CC99BC3E}"/>
+              </a:ext>
+              <a:ext uri="{C183D7F6-B498-43B3-948B-1728B52AA6E4}">
+                <adec:decorative xmlns:adec="http://schemas.microsoft.com/office/drawing/2017/decorative" val="1"/>
+              </a:ext>
+            </a:extLst>
+          </p:cNvPr>
+          <p:cNvSpPr>
+            <a:spLocks noGrp="1" noRot="1" noChangeAspect="1" noMove="1" noResize="1" noEditPoints="1" noAdjustHandles="1" noChangeArrowheads="1" noChangeShapeType="1" noTextEdit="1"/>
+          </p:cNvSpPr>
+          <p:nvPr>
+            <p:extLst>
+              <p:ext uri="{386F3935-93C4-4BCD-93E2-E3B085C9AB24}">
+                <p16:designElem xmlns:p16="http://schemas.microsoft.com/office/powerpoint/2015/main" val="1"/>
+              </p:ext>
+            </p:extLst>
+          </p:nvPr>
+        </p:nvSpPr>
+        <p:spPr>
+          <a:xfrm rot="5400000">
+            <a:off x="662559" y="605790"/>
+            <a:ext cx="73152" cy="548640"/>
+          </a:xfrm>
+          <a:prstGeom prst="rect">
+            <a:avLst/>
+          </a:prstGeom>
+          <a:solidFill>
+            <a:schemeClr val="accent2"/>
+          </a:solidFill>
+          <a:ln>
+            <a:noFill/>
+          </a:ln>
+        </p:spPr>
+        <p:style>
+          <a:lnRef idx="2">
+            <a:schemeClr val="accent1">
+              <a:shade val="50000"/>
+            </a:schemeClr>
+          </a:lnRef>
+          <a:fillRef idx="1">
+            <a:schemeClr val="accent1"/>
+          </a:fillRef>
+          <a:effectRef idx="0">
+            <a:schemeClr val="accent1"/>
+          </a:effectRef>
+          <a:fontRef idx="minor">
+            <a:schemeClr val="lt1"/>
+          </a:fontRef>
+        </p:style>
+        <p:txBody>
+          <a:bodyPr rtlCol="0" anchor="ctr"/>
+          <a:lstStyle/>
+          <a:p>
+            <a:pPr algn="ctr"/>
+            <a:endParaRPr lang="pt-BR" noProof="0" dirty="0">
+              <a:solidFill>
+                <a:prstClr val="white"/>
+              </a:solidFill>
+              <a:latin typeface="Calibri" panose="020F0502020204030204"/>
+            </a:endParaRPr>
+          </a:p>
+        </p:txBody>
+      </p:sp>
+      <p:sp>
+        <p:nvSpPr>
+          <p:cNvPr id="18" name="Rectangle 17">
+            <a:extLst>
+              <a:ext uri="{FF2B5EF4-FFF2-40B4-BE49-F238E27FC236}">
+                <a16:creationId xmlns:a16="http://schemas.microsoft.com/office/drawing/2014/main" id="{ADFA94BB-F1A1-AFDD-03CB-D35720D80E85}"/>
+              </a:ext>
+              <a:ext uri="{C183D7F6-B498-43B3-948B-1728B52AA6E4}">
+                <adec:decorative xmlns:adec="http://schemas.microsoft.com/office/drawing/2017/decorative" val="1"/>
+              </a:ext>
+            </a:extLst>
+          </p:cNvPr>
+          <p:cNvSpPr>
+            <a:spLocks noGrp="1" noRot="1" noChangeAspect="1" noMove="1" noResize="1" noEditPoints="1" noAdjustHandles="1" noChangeArrowheads="1" noChangeShapeType="1" noTextEdit="1"/>
+          </p:cNvSpPr>
+          <p:nvPr>
+            <p:extLst>
+              <p:ext uri="{386F3935-93C4-4BCD-93E2-E3B085C9AB24}">
+                <p16:designElem xmlns:p16="http://schemas.microsoft.com/office/powerpoint/2015/main" val="1"/>
+              </p:ext>
+            </p:extLst>
+          </p:nvPr>
+        </p:nvSpPr>
+        <p:spPr>
+          <a:xfrm>
+            <a:off x="428244" y="2443480"/>
+            <a:ext cx="3300984" cy="9144"/>
+          </a:xfrm>
+          <a:prstGeom prst="rect">
+            <a:avLst/>
+          </a:prstGeom>
+          <a:solidFill>
+            <a:schemeClr val="tx1"/>
+          </a:solidFill>
+          <a:ln w="3175">
+            <a:solidFill>
+              <a:schemeClr val="bg1"/>
+            </a:solidFill>
+          </a:ln>
+          <a:effectLst/>
+        </p:spPr>
+        <p:style>
+          <a:lnRef idx="2">
+            <a:schemeClr val="accent1">
+              <a:shade val="50000"/>
+            </a:schemeClr>
+          </a:lnRef>
+          <a:fillRef idx="1">
+            <a:schemeClr val="accent1"/>
+          </a:fillRef>
+          <a:effectRef idx="0">
+            <a:schemeClr val="accent1"/>
+          </a:effectRef>
+          <a:fontRef idx="minor">
+            <a:schemeClr val="lt1"/>
+          </a:fontRef>
+        </p:style>
+        <p:txBody>
+          <a:bodyPr rtlCol="0" anchor="ctr"/>
+          <a:lstStyle/>
+          <a:p>
+            <a:pPr marL="0" marR="0" lvl="0" indent="0" algn="ctr" defTabSz="914400" rtl="0" eaLnBrk="1" fontAlgn="auto" latinLnBrk="0" hangingPunct="1">
+              <a:lnSpc>
+                <a:spcPct val="100000"/>
+              </a:lnSpc>
+              <a:spcBef>
+                <a:spcPts val="0"/>
+              </a:spcBef>
+              <a:spcAft>
+                <a:spcPts val="0"/>
+              </a:spcAft>
+              <a:buClrTx/>
+              <a:buSzTx/>
+              <a:buFontTx/>
+              <a:buNone/>
+              <a:tabLst/>
+              <a:defRPr/>
+            </a:pPr>
+            <a:endParaRPr kumimoji="0" lang="pt-BR" sz="1800" b="0" i="0" u="none" strike="noStrike" kern="1200" cap="none" spc="0" normalizeH="0" baseline="0" noProof="0" dirty="0">
+              <a:ln>
+                <a:noFill/>
+              </a:ln>
+              <a:solidFill>
+                <a:prstClr val="white"/>
+              </a:solidFill>
+              <a:effectLst/>
+              <a:uLnTx/>
+              <a:uFillTx/>
+              <a:latin typeface="Calibri" panose="020F0502020204030204"/>
+              <a:ea typeface="+mn-ea"/>
+              <a:cs typeface="+mn-cs"/>
+            </a:endParaRPr>
+          </a:p>
+        </p:txBody>
+      </p:sp>
+      <p:pic>
+        <p:nvPicPr>
+          <p:cNvPr id="4" name="Espaço Reservado para Conteúdo 3">
+            <a:extLst>
+              <a:ext uri="{FF2B5EF4-FFF2-40B4-BE49-F238E27FC236}">
+                <a16:creationId xmlns:a16="http://schemas.microsoft.com/office/drawing/2014/main" id="{3ED62344-FDC0-075D-DB02-50D2007CE037}"/>
+              </a:ext>
+            </a:extLst>
+          </p:cNvPr>
+          <p:cNvPicPr>
+            <a:picLocks noGrp="1" noChangeAspect="1"/>
+          </p:cNvPicPr>
+          <p:nvPr>
+            <p:ph idx="1"/>
+          </p:nvPr>
+        </p:nvPicPr>
+        <p:blipFill>
+          <a:blip r:embed="rId3"/>
+          <a:stretch>
+            <a:fillRect/>
+          </a:stretch>
+        </p:blipFill>
+        <p:spPr>
+          <a:xfrm>
+            <a:off x="424815" y="2610104"/>
+            <a:ext cx="5132178" cy="3246491"/>
+          </a:xfrm>
+        </p:spPr>
+      </p:pic>
+      <p:pic>
+        <p:nvPicPr>
+          <p:cNvPr id="7" name="Imagem 6">
+            <a:extLst>
+              <a:ext uri="{FF2B5EF4-FFF2-40B4-BE49-F238E27FC236}">
+                <a16:creationId xmlns:a16="http://schemas.microsoft.com/office/drawing/2014/main" id="{0F663A0F-353E-6F3B-93DA-2601B803A4FA}"/>
+              </a:ext>
+            </a:extLst>
+          </p:cNvPr>
+          <p:cNvPicPr>
+            <a:picLocks noChangeAspect="1"/>
+          </p:cNvPicPr>
+          <p:nvPr/>
+        </p:nvPicPr>
+        <p:blipFill>
+          <a:blip r:embed="rId4"/>
+          <a:stretch>
+            <a:fillRect/>
+          </a:stretch>
+        </p:blipFill>
+        <p:spPr>
+          <a:xfrm>
+            <a:off x="6278241" y="1120878"/>
+            <a:ext cx="4953691" cy="3162741"/>
+          </a:xfrm>
+          <a:prstGeom prst="rect">
+            <a:avLst/>
+          </a:prstGeom>
+        </p:spPr>
+      </p:pic>
+      <p:pic>
+        <p:nvPicPr>
+          <p:cNvPr id="10" name="Imagem 9">
+            <a:extLst>
+              <a:ext uri="{FF2B5EF4-FFF2-40B4-BE49-F238E27FC236}">
+                <a16:creationId xmlns:a16="http://schemas.microsoft.com/office/drawing/2014/main" id="{466B1F16-998C-0BCB-12A2-465460415BCE}"/>
+              </a:ext>
+            </a:extLst>
+          </p:cNvPr>
+          <p:cNvPicPr>
+            <a:picLocks noChangeAspect="1"/>
+          </p:cNvPicPr>
+          <p:nvPr/>
+        </p:nvPicPr>
+        <p:blipFill>
+          <a:blip r:embed="rId5"/>
+          <a:stretch>
+            <a:fillRect/>
+          </a:stretch>
+        </p:blipFill>
+        <p:spPr>
+          <a:xfrm>
+            <a:off x="5972004" y="4487337"/>
+            <a:ext cx="5472725" cy="1388203"/>
+          </a:xfrm>
+          <a:prstGeom prst="rect">
+            <a:avLst/>
+          </a:prstGeom>
+        </p:spPr>
+      </p:pic>
     </p:spTree>
     <p:extLst>
       <p:ext uri="{BB962C8B-B14F-4D97-AF65-F5344CB8AC3E}">
@@ -4963,7 +6327,979 @@
 </p:sld>
 </file>
 
-<file path=ppt/slides/slide12.xml><?xml version="1.0" encoding="utf-8"?>
+<file path=ppt/slides/slide14.xml><?xml version="1.0" encoding="utf-8"?>
+<p:sld xmlns:a="http://schemas.openxmlformats.org/drawingml/2006/main" xmlns:r="http://schemas.openxmlformats.org/officeDocument/2006/relationships" xmlns:p="http://schemas.openxmlformats.org/presentationml/2006/main">
+  <p:cSld>
+    <p:bg>
+      <p:bgPr>
+        <a:solidFill>
+          <a:schemeClr val="bg1"/>
+        </a:solidFill>
+        <a:effectLst/>
+      </p:bgPr>
+    </p:bg>
+    <p:spTree>
+      <p:nvGrpSpPr>
+        <p:cNvPr id="1" name="">
+          <a:extLst>
+            <a:ext uri="{FF2B5EF4-FFF2-40B4-BE49-F238E27FC236}">
+              <a16:creationId xmlns:a16="http://schemas.microsoft.com/office/drawing/2014/main" id="{A9F5E3D1-7AA1-866A-B155-518F12B85C16}"/>
+            </a:ext>
+          </a:extLst>
+        </p:cNvPr>
+        <p:cNvGrpSpPr/>
+        <p:nvPr/>
+      </p:nvGrpSpPr>
+      <p:grpSpPr>
+        <a:xfrm>
+          <a:off x="0" y="0"/>
+          <a:ext cx="0" cy="0"/>
+          <a:chOff x="0" y="0"/>
+          <a:chExt cx="0" cy="0"/>
+        </a:xfrm>
+      </p:grpSpPr>
+      <p:sp useBgFill="1">
+        <p:nvSpPr>
+          <p:cNvPr id="12" name="Rectangle 11">
+            <a:extLst>
+              <a:ext uri="{FF2B5EF4-FFF2-40B4-BE49-F238E27FC236}">
+                <a16:creationId xmlns:a16="http://schemas.microsoft.com/office/drawing/2014/main" id="{4A90BCF1-EC64-101F-DBF3-AC5DDCA7FE35}"/>
+              </a:ext>
+              <a:ext uri="{C183D7F6-B498-43B3-948B-1728B52AA6E4}">
+                <adec:decorative xmlns:adec="http://schemas.microsoft.com/office/drawing/2017/decorative" val="1"/>
+              </a:ext>
+            </a:extLst>
+          </p:cNvPr>
+          <p:cNvSpPr>
+            <a:spLocks noGrp="1" noRot="1" noChangeAspect="1" noMove="1" noResize="1" noEditPoints="1" noAdjustHandles="1" noChangeArrowheads="1" noChangeShapeType="1" noTextEdit="1"/>
+          </p:cNvSpPr>
+          <p:nvPr>
+            <p:extLst>
+              <p:ext uri="{386F3935-93C4-4BCD-93E2-E3B085C9AB24}">
+                <p16:designElem xmlns:p16="http://schemas.microsoft.com/office/powerpoint/2015/main" val="1"/>
+              </p:ext>
+            </p:extLst>
+          </p:nvPr>
+        </p:nvSpPr>
+        <p:spPr>
+          <a:xfrm>
+            <a:off x="0" y="0"/>
+            <a:ext cx="12192000" cy="6858000"/>
+          </a:xfrm>
+          <a:prstGeom prst="rect">
+            <a:avLst/>
+          </a:prstGeom>
+          <a:ln>
+            <a:noFill/>
+          </a:ln>
+        </p:spPr>
+        <p:style>
+          <a:lnRef idx="2">
+            <a:schemeClr val="accent1">
+              <a:shade val="50000"/>
+            </a:schemeClr>
+          </a:lnRef>
+          <a:fillRef idx="1">
+            <a:schemeClr val="accent1"/>
+          </a:fillRef>
+          <a:effectRef idx="0">
+            <a:schemeClr val="accent1"/>
+          </a:effectRef>
+          <a:fontRef idx="minor">
+            <a:schemeClr val="lt1"/>
+          </a:fontRef>
+        </p:style>
+        <p:txBody>
+          <a:bodyPr rtlCol="0" anchor="ctr"/>
+          <a:lstStyle/>
+          <a:p>
+            <a:pPr algn="ctr"/>
+            <a:endParaRPr lang="pt-BR" noProof="0" dirty="0"/>
+          </a:p>
+        </p:txBody>
+      </p:sp>
+      <p:pic>
+        <p:nvPicPr>
+          <p:cNvPr id="5" name="Espaço Reservado para Conteúdo 4" descr="Uma imagem contendo mesa, quarto, balcão, espelho&#10;&#10;O conteúdo gerado por IA pode estar incorreto.">
+            <a:extLst>
+              <a:ext uri="{FF2B5EF4-FFF2-40B4-BE49-F238E27FC236}">
+                <a16:creationId xmlns:a16="http://schemas.microsoft.com/office/drawing/2014/main" id="{9846A4BD-57D5-3910-AAC4-93EF667A7C96}"/>
+              </a:ext>
+            </a:extLst>
+          </p:cNvPr>
+          <p:cNvPicPr>
+            <a:picLocks noChangeAspect="1"/>
+          </p:cNvPicPr>
+          <p:nvPr/>
+        </p:nvPicPr>
+        <p:blipFill>
+          <a:blip r:embed="rId2">
+            <a:extLst>
+              <a:ext uri="{28A0092B-C50C-407E-A947-70E740481C1C}">
+                <a14:useLocalDpi xmlns:a14="http://schemas.microsoft.com/office/drawing/2010/main" val="0"/>
+              </a:ext>
+            </a:extLst>
+          </a:blip>
+          <a:srcRect t="28087" r="9090" b="-1"/>
+          <a:stretch/>
+        </p:blipFill>
+        <p:spPr>
+          <a:xfrm>
+            <a:off x="3522468" y="10"/>
+            <a:ext cx="8669532" cy="6857990"/>
+          </a:xfrm>
+          <a:prstGeom prst="rect">
+            <a:avLst/>
+          </a:prstGeom>
+        </p:spPr>
+      </p:pic>
+      <p:sp>
+        <p:nvSpPr>
+          <p:cNvPr id="14" name="Rectangle 13">
+            <a:extLst>
+              <a:ext uri="{FF2B5EF4-FFF2-40B4-BE49-F238E27FC236}">
+                <a16:creationId xmlns:a16="http://schemas.microsoft.com/office/drawing/2014/main" id="{87B89CFE-EEB3-DCF6-903A-C8B2A6D59580}"/>
+              </a:ext>
+              <a:ext uri="{C183D7F6-B498-43B3-948B-1728B52AA6E4}">
+                <adec:decorative xmlns:adec="http://schemas.microsoft.com/office/drawing/2017/decorative" val="1"/>
+              </a:ext>
+            </a:extLst>
+          </p:cNvPr>
+          <p:cNvSpPr>
+            <a:spLocks noGrp="1" noRot="1" noChangeAspect="1" noMove="1" noResize="1" noEditPoints="1" noAdjustHandles="1" noChangeArrowheads="1" noChangeShapeType="1" noTextEdit="1"/>
+          </p:cNvSpPr>
+          <p:nvPr>
+            <p:extLst>
+              <p:ext uri="{386F3935-93C4-4BCD-93E2-E3B085C9AB24}">
+                <p16:designElem xmlns:p16="http://schemas.microsoft.com/office/powerpoint/2015/main" val="1"/>
+              </p:ext>
+            </p:extLst>
+          </p:nvPr>
+        </p:nvSpPr>
+        <p:spPr>
+          <a:xfrm>
+            <a:off x="2" y="0"/>
+            <a:ext cx="9756601" cy="6858000"/>
+          </a:xfrm>
+          <a:prstGeom prst="rect">
+            <a:avLst/>
+          </a:prstGeom>
+          <a:gradFill>
+            <a:gsLst>
+              <a:gs pos="58000">
+                <a:schemeClr val="tx1"/>
+              </a:gs>
+              <a:gs pos="35000">
+                <a:schemeClr val="tx1">
+                  <a:alpha val="78000"/>
+                </a:schemeClr>
+              </a:gs>
+              <a:gs pos="19000">
+                <a:schemeClr val="tx1">
+                  <a:alpha val="38000"/>
+                </a:schemeClr>
+              </a:gs>
+              <a:gs pos="0">
+                <a:schemeClr val="tx1">
+                  <a:alpha val="0"/>
+                </a:schemeClr>
+              </a:gs>
+              <a:gs pos="100000">
+                <a:schemeClr val="tx1"/>
+              </a:gs>
+            </a:gsLst>
+            <a:lin ang="10800000" scaled="0"/>
+          </a:gradFill>
+          <a:ln>
+            <a:noFill/>
+          </a:ln>
+        </p:spPr>
+        <p:style>
+          <a:lnRef idx="2">
+            <a:schemeClr val="accent1">
+              <a:shade val="50000"/>
+            </a:schemeClr>
+          </a:lnRef>
+          <a:fillRef idx="1">
+            <a:schemeClr val="accent1"/>
+          </a:fillRef>
+          <a:effectRef idx="0">
+            <a:schemeClr val="accent1"/>
+          </a:effectRef>
+          <a:fontRef idx="minor">
+            <a:schemeClr val="lt1"/>
+          </a:fontRef>
+        </p:style>
+        <p:txBody>
+          <a:bodyPr rtlCol="0" anchor="ctr"/>
+          <a:lstStyle/>
+          <a:p>
+            <a:pPr algn="ctr"/>
+            <a:endParaRPr lang="pt-BR" noProof="0" dirty="0"/>
+          </a:p>
+        </p:txBody>
+      </p:sp>
+      <p:sp>
+        <p:nvSpPr>
+          <p:cNvPr id="2" name="Título 1">
+            <a:extLst>
+              <a:ext uri="{FF2B5EF4-FFF2-40B4-BE49-F238E27FC236}">
+                <a16:creationId xmlns:a16="http://schemas.microsoft.com/office/drawing/2014/main" id="{A385C073-8F73-A196-CEE3-1F3745D10C89}"/>
+              </a:ext>
+            </a:extLst>
+          </p:cNvPr>
+          <p:cNvSpPr>
+            <a:spLocks noGrp="1"/>
+          </p:cNvSpPr>
+          <p:nvPr>
+            <p:ph type="title"/>
+          </p:nvPr>
+        </p:nvSpPr>
+        <p:spPr>
+          <a:xfrm>
+            <a:off x="371094" y="1161288"/>
+            <a:ext cx="3438144" cy="1124712"/>
+          </a:xfrm>
+        </p:spPr>
+        <p:txBody>
+          <a:bodyPr anchor="b">
+            <a:normAutofit/>
+          </a:bodyPr>
+          <a:lstStyle/>
+          <a:p>
+            <a:r>
+              <a:rPr lang="pt-BR" sz="2800" noProof="0" dirty="0">
+                <a:solidFill>
+                  <a:schemeClr val="bg1"/>
+                </a:solidFill>
+              </a:rPr>
+              <a:t>Análise exploratória</a:t>
+            </a:r>
+          </a:p>
+        </p:txBody>
+      </p:sp>
+      <p:sp>
+        <p:nvSpPr>
+          <p:cNvPr id="16" name="Rectangle 15">
+            <a:extLst>
+              <a:ext uri="{FF2B5EF4-FFF2-40B4-BE49-F238E27FC236}">
+                <a16:creationId xmlns:a16="http://schemas.microsoft.com/office/drawing/2014/main" id="{0E6B49BD-E65A-2A17-077A-5E815EF12F91}"/>
+              </a:ext>
+              <a:ext uri="{C183D7F6-B498-43B3-948B-1728B52AA6E4}">
+                <adec:decorative xmlns:adec="http://schemas.microsoft.com/office/drawing/2017/decorative" val="1"/>
+              </a:ext>
+            </a:extLst>
+          </p:cNvPr>
+          <p:cNvSpPr>
+            <a:spLocks noGrp="1" noRot="1" noChangeAspect="1" noMove="1" noResize="1" noEditPoints="1" noAdjustHandles="1" noChangeArrowheads="1" noChangeShapeType="1" noTextEdit="1"/>
+          </p:cNvSpPr>
+          <p:nvPr>
+            <p:extLst>
+              <p:ext uri="{386F3935-93C4-4BCD-93E2-E3B085C9AB24}">
+                <p16:designElem xmlns:p16="http://schemas.microsoft.com/office/powerpoint/2015/main" val="1"/>
+              </p:ext>
+            </p:extLst>
+          </p:nvPr>
+        </p:nvSpPr>
+        <p:spPr>
+          <a:xfrm rot="5400000">
+            <a:off x="662559" y="605790"/>
+            <a:ext cx="73152" cy="548640"/>
+          </a:xfrm>
+          <a:prstGeom prst="rect">
+            <a:avLst/>
+          </a:prstGeom>
+          <a:solidFill>
+            <a:schemeClr val="accent2"/>
+          </a:solidFill>
+          <a:ln>
+            <a:noFill/>
+          </a:ln>
+        </p:spPr>
+        <p:style>
+          <a:lnRef idx="2">
+            <a:schemeClr val="accent1">
+              <a:shade val="50000"/>
+            </a:schemeClr>
+          </a:lnRef>
+          <a:fillRef idx="1">
+            <a:schemeClr val="accent1"/>
+          </a:fillRef>
+          <a:effectRef idx="0">
+            <a:schemeClr val="accent1"/>
+          </a:effectRef>
+          <a:fontRef idx="minor">
+            <a:schemeClr val="lt1"/>
+          </a:fontRef>
+        </p:style>
+        <p:txBody>
+          <a:bodyPr rtlCol="0" anchor="ctr"/>
+          <a:lstStyle/>
+          <a:p>
+            <a:pPr algn="ctr"/>
+            <a:endParaRPr lang="pt-BR" noProof="0" dirty="0">
+              <a:solidFill>
+                <a:prstClr val="white"/>
+              </a:solidFill>
+              <a:latin typeface="Calibri" panose="020F0502020204030204"/>
+            </a:endParaRPr>
+          </a:p>
+        </p:txBody>
+      </p:sp>
+      <p:sp>
+        <p:nvSpPr>
+          <p:cNvPr id="18" name="Rectangle 17">
+            <a:extLst>
+              <a:ext uri="{FF2B5EF4-FFF2-40B4-BE49-F238E27FC236}">
+                <a16:creationId xmlns:a16="http://schemas.microsoft.com/office/drawing/2014/main" id="{871FF7D5-58C5-E557-B085-CC996A3EEDE3}"/>
+              </a:ext>
+              <a:ext uri="{C183D7F6-B498-43B3-948B-1728B52AA6E4}">
+                <adec:decorative xmlns:adec="http://schemas.microsoft.com/office/drawing/2017/decorative" val="1"/>
+              </a:ext>
+            </a:extLst>
+          </p:cNvPr>
+          <p:cNvSpPr>
+            <a:spLocks noGrp="1" noRot="1" noChangeAspect="1" noMove="1" noResize="1" noEditPoints="1" noAdjustHandles="1" noChangeArrowheads="1" noChangeShapeType="1" noTextEdit="1"/>
+          </p:cNvSpPr>
+          <p:nvPr>
+            <p:extLst>
+              <p:ext uri="{386F3935-93C4-4BCD-93E2-E3B085C9AB24}">
+                <p16:designElem xmlns:p16="http://schemas.microsoft.com/office/powerpoint/2015/main" val="1"/>
+              </p:ext>
+            </p:extLst>
+          </p:nvPr>
+        </p:nvSpPr>
+        <p:spPr>
+          <a:xfrm>
+            <a:off x="428244" y="2443480"/>
+            <a:ext cx="3300984" cy="9144"/>
+          </a:xfrm>
+          <a:prstGeom prst="rect">
+            <a:avLst/>
+          </a:prstGeom>
+          <a:solidFill>
+            <a:schemeClr val="tx1"/>
+          </a:solidFill>
+          <a:ln w="3175">
+            <a:solidFill>
+              <a:schemeClr val="bg1"/>
+            </a:solidFill>
+          </a:ln>
+          <a:effectLst/>
+        </p:spPr>
+        <p:style>
+          <a:lnRef idx="2">
+            <a:schemeClr val="accent1">
+              <a:shade val="50000"/>
+            </a:schemeClr>
+          </a:lnRef>
+          <a:fillRef idx="1">
+            <a:schemeClr val="accent1"/>
+          </a:fillRef>
+          <a:effectRef idx="0">
+            <a:schemeClr val="accent1"/>
+          </a:effectRef>
+          <a:fontRef idx="minor">
+            <a:schemeClr val="lt1"/>
+          </a:fontRef>
+        </p:style>
+        <p:txBody>
+          <a:bodyPr rtlCol="0" anchor="ctr"/>
+          <a:lstStyle/>
+          <a:p>
+            <a:pPr marL="0" marR="0" lvl="0" indent="0" algn="ctr" defTabSz="914400" rtl="0" eaLnBrk="1" fontAlgn="auto" latinLnBrk="0" hangingPunct="1">
+              <a:lnSpc>
+                <a:spcPct val="100000"/>
+              </a:lnSpc>
+              <a:spcBef>
+                <a:spcPts val="0"/>
+              </a:spcBef>
+              <a:spcAft>
+                <a:spcPts val="0"/>
+              </a:spcAft>
+              <a:buClrTx/>
+              <a:buSzTx/>
+              <a:buFontTx/>
+              <a:buNone/>
+              <a:tabLst/>
+              <a:defRPr/>
+            </a:pPr>
+            <a:endParaRPr kumimoji="0" lang="pt-BR" sz="1800" b="0" i="0" u="none" strike="noStrike" kern="1200" cap="none" spc="0" normalizeH="0" baseline="0" noProof="0" dirty="0">
+              <a:ln>
+                <a:noFill/>
+              </a:ln>
+              <a:solidFill>
+                <a:prstClr val="white"/>
+              </a:solidFill>
+              <a:effectLst/>
+              <a:uLnTx/>
+              <a:uFillTx/>
+              <a:latin typeface="Calibri" panose="020F0502020204030204"/>
+              <a:ea typeface="+mn-ea"/>
+              <a:cs typeface="+mn-cs"/>
+            </a:endParaRPr>
+          </a:p>
+        </p:txBody>
+      </p:sp>
+      <p:pic>
+        <p:nvPicPr>
+          <p:cNvPr id="4" name="Espaço Reservado para Conteúdo 3">
+            <a:extLst>
+              <a:ext uri="{FF2B5EF4-FFF2-40B4-BE49-F238E27FC236}">
+                <a16:creationId xmlns:a16="http://schemas.microsoft.com/office/drawing/2014/main" id="{2EB99D51-6729-7551-F1E1-AD309E3593D9}"/>
+              </a:ext>
+            </a:extLst>
+          </p:cNvPr>
+          <p:cNvPicPr>
+            <a:picLocks noGrp="1" noChangeAspect="1"/>
+          </p:cNvPicPr>
+          <p:nvPr>
+            <p:ph idx="1"/>
+          </p:nvPr>
+        </p:nvPicPr>
+        <p:blipFill>
+          <a:blip r:embed="rId3"/>
+          <a:stretch>
+            <a:fillRect/>
+          </a:stretch>
+        </p:blipFill>
+        <p:spPr>
+          <a:xfrm>
+            <a:off x="424815" y="2737346"/>
+            <a:ext cx="10653083" cy="1956457"/>
+          </a:xfrm>
+        </p:spPr>
+      </p:pic>
+      <p:pic>
+        <p:nvPicPr>
+          <p:cNvPr id="7" name="Imagem 6">
+            <a:extLst>
+              <a:ext uri="{FF2B5EF4-FFF2-40B4-BE49-F238E27FC236}">
+                <a16:creationId xmlns:a16="http://schemas.microsoft.com/office/drawing/2014/main" id="{3FB52592-908E-E355-87DA-3BCD58E76DEF}"/>
+              </a:ext>
+            </a:extLst>
+          </p:cNvPr>
+          <p:cNvPicPr>
+            <a:picLocks noChangeAspect="1"/>
+          </p:cNvPicPr>
+          <p:nvPr/>
+        </p:nvPicPr>
+        <p:blipFill>
+          <a:blip r:embed="rId4"/>
+          <a:stretch>
+            <a:fillRect/>
+          </a:stretch>
+        </p:blipFill>
+        <p:spPr>
+          <a:xfrm>
+            <a:off x="424815" y="4931111"/>
+            <a:ext cx="11247303" cy="1624964"/>
+          </a:xfrm>
+          <a:prstGeom prst="rect">
+            <a:avLst/>
+          </a:prstGeom>
+        </p:spPr>
+      </p:pic>
+    </p:spTree>
+    <p:extLst>
+      <p:ext uri="{BB962C8B-B14F-4D97-AF65-F5344CB8AC3E}">
+        <p14:creationId xmlns:p14="http://schemas.microsoft.com/office/powerpoint/2010/main" val="2077843010"/>
+      </p:ext>
+    </p:extLst>
+  </p:cSld>
+  <p:clrMapOvr>
+    <a:masterClrMapping/>
+  </p:clrMapOvr>
+</p:sld>
+</file>
+
+<file path=ppt/slides/slide15.xml><?xml version="1.0" encoding="utf-8"?>
+<p:sld xmlns:a="http://schemas.openxmlformats.org/drawingml/2006/main" xmlns:r="http://schemas.openxmlformats.org/officeDocument/2006/relationships" xmlns:p="http://schemas.openxmlformats.org/presentationml/2006/main">
+  <p:cSld>
+    <p:bg>
+      <p:bgPr>
+        <a:solidFill>
+          <a:schemeClr val="bg1"/>
+        </a:solidFill>
+        <a:effectLst/>
+      </p:bgPr>
+    </p:bg>
+    <p:spTree>
+      <p:nvGrpSpPr>
+        <p:cNvPr id="1" name="">
+          <a:extLst>
+            <a:ext uri="{FF2B5EF4-FFF2-40B4-BE49-F238E27FC236}">
+              <a16:creationId xmlns:a16="http://schemas.microsoft.com/office/drawing/2014/main" id="{B21A9615-8C25-9385-B316-B521D764D401}"/>
+            </a:ext>
+          </a:extLst>
+        </p:cNvPr>
+        <p:cNvGrpSpPr/>
+        <p:nvPr/>
+      </p:nvGrpSpPr>
+      <p:grpSpPr>
+        <a:xfrm>
+          <a:off x="0" y="0"/>
+          <a:ext cx="0" cy="0"/>
+          <a:chOff x="0" y="0"/>
+          <a:chExt cx="0" cy="0"/>
+        </a:xfrm>
+      </p:grpSpPr>
+      <p:sp useBgFill="1">
+        <p:nvSpPr>
+          <p:cNvPr id="19" name="Rectangle 11">
+            <a:extLst>
+              <a:ext uri="{FF2B5EF4-FFF2-40B4-BE49-F238E27FC236}">
+                <a16:creationId xmlns:a16="http://schemas.microsoft.com/office/drawing/2014/main" id="{26FDAD33-930B-15A1-E523-83A2F4440551}"/>
+              </a:ext>
+              <a:ext uri="{C183D7F6-B498-43B3-948B-1728B52AA6E4}">
+                <adec:decorative xmlns:adec="http://schemas.microsoft.com/office/drawing/2017/decorative" val="1"/>
+              </a:ext>
+            </a:extLst>
+          </p:cNvPr>
+          <p:cNvSpPr>
+            <a:spLocks noGrp="1" noRot="1" noChangeAspect="1" noMove="1" noResize="1" noEditPoints="1" noAdjustHandles="1" noChangeArrowheads="1" noChangeShapeType="1" noTextEdit="1"/>
+          </p:cNvSpPr>
+          <p:nvPr>
+            <p:extLst>
+              <p:ext uri="{386F3935-93C4-4BCD-93E2-E3B085C9AB24}">
+                <p16:designElem xmlns:p16="http://schemas.microsoft.com/office/powerpoint/2015/main" val="1"/>
+              </p:ext>
+            </p:extLst>
+          </p:nvPr>
+        </p:nvSpPr>
+        <p:spPr>
+          <a:xfrm>
+            <a:off x="0" y="0"/>
+            <a:ext cx="12192000" cy="6858000"/>
+          </a:xfrm>
+          <a:prstGeom prst="rect">
+            <a:avLst/>
+          </a:prstGeom>
+          <a:ln>
+            <a:noFill/>
+          </a:ln>
+        </p:spPr>
+        <p:style>
+          <a:lnRef idx="2">
+            <a:schemeClr val="accent1">
+              <a:shade val="50000"/>
+            </a:schemeClr>
+          </a:lnRef>
+          <a:fillRef idx="1">
+            <a:schemeClr val="accent1"/>
+          </a:fillRef>
+          <a:effectRef idx="0">
+            <a:schemeClr val="accent1"/>
+          </a:effectRef>
+          <a:fontRef idx="minor">
+            <a:schemeClr val="lt1"/>
+          </a:fontRef>
+        </p:style>
+        <p:txBody>
+          <a:bodyPr rtlCol="0" anchor="ctr"/>
+          <a:lstStyle/>
+          <a:p>
+            <a:pPr algn="ctr"/>
+            <a:endParaRPr lang="pt-BR" noProof="0" dirty="0"/>
+          </a:p>
+        </p:txBody>
+      </p:sp>
+      <p:pic>
+        <p:nvPicPr>
+          <p:cNvPr id="5" name="Espaço Reservado para Conteúdo 4" descr="Uma imagem contendo no interior, mesa, vivendo, quarto&#10;&#10;O conteúdo gerado por IA pode estar incorreto.">
+            <a:extLst>
+              <a:ext uri="{FF2B5EF4-FFF2-40B4-BE49-F238E27FC236}">
+                <a16:creationId xmlns:a16="http://schemas.microsoft.com/office/drawing/2014/main" id="{E358C64D-0205-7ECC-3262-522879FCFAE6}"/>
+              </a:ext>
+            </a:extLst>
+          </p:cNvPr>
+          <p:cNvPicPr>
+            <a:picLocks noChangeAspect="1"/>
+          </p:cNvPicPr>
+          <p:nvPr/>
+        </p:nvPicPr>
+        <p:blipFill>
+          <a:blip r:embed="rId2">
+            <a:extLst>
+              <a:ext uri="{28A0092B-C50C-407E-A947-70E740481C1C}">
+                <a14:useLocalDpi xmlns:a14="http://schemas.microsoft.com/office/drawing/2010/main" val="0"/>
+              </a:ext>
+            </a:extLst>
+          </a:blip>
+          <a:srcRect l="9091" t="28087" r="-1" b="-1"/>
+          <a:stretch/>
+        </p:blipFill>
+        <p:spPr>
+          <a:xfrm>
+            <a:off x="3522468" y="10"/>
+            <a:ext cx="8669532" cy="6857990"/>
+          </a:xfrm>
+          <a:prstGeom prst="rect">
+            <a:avLst/>
+          </a:prstGeom>
+        </p:spPr>
+      </p:pic>
+      <p:sp>
+        <p:nvSpPr>
+          <p:cNvPr id="20" name="Rectangle 13">
+            <a:extLst>
+              <a:ext uri="{FF2B5EF4-FFF2-40B4-BE49-F238E27FC236}">
+                <a16:creationId xmlns:a16="http://schemas.microsoft.com/office/drawing/2014/main" id="{D7105690-5F53-A38A-5A89-A54019786652}"/>
+              </a:ext>
+              <a:ext uri="{C183D7F6-B498-43B3-948B-1728B52AA6E4}">
+                <adec:decorative xmlns:adec="http://schemas.microsoft.com/office/drawing/2017/decorative" val="1"/>
+              </a:ext>
+            </a:extLst>
+          </p:cNvPr>
+          <p:cNvSpPr>
+            <a:spLocks noGrp="1" noRot="1" noChangeAspect="1" noMove="1" noResize="1" noEditPoints="1" noAdjustHandles="1" noChangeArrowheads="1" noChangeShapeType="1" noTextEdit="1"/>
+          </p:cNvSpPr>
+          <p:nvPr>
+            <p:extLst>
+              <p:ext uri="{386F3935-93C4-4BCD-93E2-E3B085C9AB24}">
+                <p16:designElem xmlns:p16="http://schemas.microsoft.com/office/powerpoint/2015/main" val="1"/>
+              </p:ext>
+            </p:extLst>
+          </p:nvPr>
+        </p:nvSpPr>
+        <p:spPr>
+          <a:xfrm>
+            <a:off x="2" y="0"/>
+            <a:ext cx="9756601" cy="6858000"/>
+          </a:xfrm>
+          <a:prstGeom prst="rect">
+            <a:avLst/>
+          </a:prstGeom>
+          <a:gradFill>
+            <a:gsLst>
+              <a:gs pos="58000">
+                <a:schemeClr val="tx1"/>
+              </a:gs>
+              <a:gs pos="35000">
+                <a:schemeClr val="tx1">
+                  <a:alpha val="78000"/>
+                </a:schemeClr>
+              </a:gs>
+              <a:gs pos="19000">
+                <a:schemeClr val="tx1">
+                  <a:alpha val="38000"/>
+                </a:schemeClr>
+              </a:gs>
+              <a:gs pos="0">
+                <a:schemeClr val="tx1">
+                  <a:alpha val="0"/>
+                </a:schemeClr>
+              </a:gs>
+              <a:gs pos="100000">
+                <a:schemeClr val="tx1"/>
+              </a:gs>
+            </a:gsLst>
+            <a:lin ang="10800000" scaled="0"/>
+          </a:gradFill>
+          <a:ln>
+            <a:noFill/>
+          </a:ln>
+        </p:spPr>
+        <p:style>
+          <a:lnRef idx="2">
+            <a:schemeClr val="accent1">
+              <a:shade val="50000"/>
+            </a:schemeClr>
+          </a:lnRef>
+          <a:fillRef idx="1">
+            <a:schemeClr val="accent1"/>
+          </a:fillRef>
+          <a:effectRef idx="0">
+            <a:schemeClr val="accent1"/>
+          </a:effectRef>
+          <a:fontRef idx="minor">
+            <a:schemeClr val="lt1"/>
+          </a:fontRef>
+        </p:style>
+        <p:txBody>
+          <a:bodyPr rtlCol="0" anchor="ctr"/>
+          <a:lstStyle/>
+          <a:p>
+            <a:pPr algn="ctr"/>
+            <a:endParaRPr lang="pt-BR" noProof="0" dirty="0"/>
+          </a:p>
+        </p:txBody>
+      </p:sp>
+      <p:sp>
+        <p:nvSpPr>
+          <p:cNvPr id="2" name="Título 1">
+            <a:extLst>
+              <a:ext uri="{FF2B5EF4-FFF2-40B4-BE49-F238E27FC236}">
+                <a16:creationId xmlns:a16="http://schemas.microsoft.com/office/drawing/2014/main" id="{72DC1CB6-34D5-E818-5DFB-042414724177}"/>
+              </a:ext>
+            </a:extLst>
+          </p:cNvPr>
+          <p:cNvSpPr>
+            <a:spLocks noGrp="1"/>
+          </p:cNvSpPr>
+          <p:nvPr>
+            <p:ph type="title"/>
+          </p:nvPr>
+        </p:nvSpPr>
+        <p:spPr>
+          <a:xfrm>
+            <a:off x="371094" y="1161288"/>
+            <a:ext cx="3438144" cy="1124712"/>
+          </a:xfrm>
+        </p:spPr>
+        <p:txBody>
+          <a:bodyPr anchor="b">
+            <a:normAutofit/>
+          </a:bodyPr>
+          <a:lstStyle/>
+          <a:p>
+            <a:r>
+              <a:rPr lang="pt-BR" sz="2800" noProof="0" dirty="0">
+                <a:solidFill>
+                  <a:schemeClr val="bg1"/>
+                </a:solidFill>
+              </a:rPr>
+              <a:t>Resultados obtidos</a:t>
+            </a:r>
+          </a:p>
+        </p:txBody>
+      </p:sp>
+      <p:sp>
+        <p:nvSpPr>
+          <p:cNvPr id="21" name="Rectangle 15">
+            <a:extLst>
+              <a:ext uri="{FF2B5EF4-FFF2-40B4-BE49-F238E27FC236}">
+                <a16:creationId xmlns:a16="http://schemas.microsoft.com/office/drawing/2014/main" id="{61D70B0F-A49D-B4B6-622F-C981F3786F9D}"/>
+              </a:ext>
+              <a:ext uri="{C183D7F6-B498-43B3-948B-1728B52AA6E4}">
+                <adec:decorative xmlns:adec="http://schemas.microsoft.com/office/drawing/2017/decorative" val="1"/>
+              </a:ext>
+            </a:extLst>
+          </p:cNvPr>
+          <p:cNvSpPr>
+            <a:spLocks noGrp="1" noRot="1" noChangeAspect="1" noMove="1" noResize="1" noEditPoints="1" noAdjustHandles="1" noChangeArrowheads="1" noChangeShapeType="1" noTextEdit="1"/>
+          </p:cNvSpPr>
+          <p:nvPr>
+            <p:extLst>
+              <p:ext uri="{386F3935-93C4-4BCD-93E2-E3B085C9AB24}">
+                <p16:designElem xmlns:p16="http://schemas.microsoft.com/office/powerpoint/2015/main" val="1"/>
+              </p:ext>
+            </p:extLst>
+          </p:nvPr>
+        </p:nvSpPr>
+        <p:spPr>
+          <a:xfrm rot="5400000">
+            <a:off x="662559" y="605790"/>
+            <a:ext cx="73152" cy="548640"/>
+          </a:xfrm>
+          <a:prstGeom prst="rect">
+            <a:avLst/>
+          </a:prstGeom>
+          <a:solidFill>
+            <a:schemeClr val="accent2"/>
+          </a:solidFill>
+          <a:ln>
+            <a:noFill/>
+          </a:ln>
+        </p:spPr>
+        <p:style>
+          <a:lnRef idx="2">
+            <a:schemeClr val="accent1">
+              <a:shade val="50000"/>
+            </a:schemeClr>
+          </a:lnRef>
+          <a:fillRef idx="1">
+            <a:schemeClr val="accent1"/>
+          </a:fillRef>
+          <a:effectRef idx="0">
+            <a:schemeClr val="accent1"/>
+          </a:effectRef>
+          <a:fontRef idx="minor">
+            <a:schemeClr val="lt1"/>
+          </a:fontRef>
+        </p:style>
+        <p:txBody>
+          <a:bodyPr rtlCol="0" anchor="ctr"/>
+          <a:lstStyle/>
+          <a:p>
+            <a:pPr algn="ctr"/>
+            <a:endParaRPr lang="pt-BR" noProof="0" dirty="0">
+              <a:solidFill>
+                <a:prstClr val="white"/>
+              </a:solidFill>
+              <a:latin typeface="Calibri" panose="020F0502020204030204"/>
+            </a:endParaRPr>
+          </a:p>
+        </p:txBody>
+      </p:sp>
+      <p:sp>
+        <p:nvSpPr>
+          <p:cNvPr id="18" name="Rectangle 17">
+            <a:extLst>
+              <a:ext uri="{FF2B5EF4-FFF2-40B4-BE49-F238E27FC236}">
+                <a16:creationId xmlns:a16="http://schemas.microsoft.com/office/drawing/2014/main" id="{A4C14C7D-F526-E86B-66A3-C37BEB9AFF35}"/>
+              </a:ext>
+              <a:ext uri="{C183D7F6-B498-43B3-948B-1728B52AA6E4}">
+                <adec:decorative xmlns:adec="http://schemas.microsoft.com/office/drawing/2017/decorative" val="1"/>
+              </a:ext>
+            </a:extLst>
+          </p:cNvPr>
+          <p:cNvSpPr>
+            <a:spLocks noGrp="1" noRot="1" noChangeAspect="1" noMove="1" noResize="1" noEditPoints="1" noAdjustHandles="1" noChangeArrowheads="1" noChangeShapeType="1" noTextEdit="1"/>
+          </p:cNvSpPr>
+          <p:nvPr>
+            <p:extLst>
+              <p:ext uri="{386F3935-93C4-4BCD-93E2-E3B085C9AB24}">
+                <p16:designElem xmlns:p16="http://schemas.microsoft.com/office/powerpoint/2015/main" val="1"/>
+              </p:ext>
+            </p:extLst>
+          </p:nvPr>
+        </p:nvSpPr>
+        <p:spPr>
+          <a:xfrm>
+            <a:off x="428244" y="2443480"/>
+            <a:ext cx="3300984" cy="9144"/>
+          </a:xfrm>
+          <a:prstGeom prst="rect">
+            <a:avLst/>
+          </a:prstGeom>
+          <a:solidFill>
+            <a:schemeClr val="tx1"/>
+          </a:solidFill>
+          <a:ln w="3175">
+            <a:solidFill>
+              <a:schemeClr val="bg1"/>
+            </a:solidFill>
+          </a:ln>
+          <a:effectLst/>
+        </p:spPr>
+        <p:style>
+          <a:lnRef idx="2">
+            <a:schemeClr val="accent1">
+              <a:shade val="50000"/>
+            </a:schemeClr>
+          </a:lnRef>
+          <a:fillRef idx="1">
+            <a:schemeClr val="accent1"/>
+          </a:fillRef>
+          <a:effectRef idx="0">
+            <a:schemeClr val="accent1"/>
+          </a:effectRef>
+          <a:fontRef idx="minor">
+            <a:schemeClr val="lt1"/>
+          </a:fontRef>
+        </p:style>
+        <p:txBody>
+          <a:bodyPr rtlCol="0" anchor="ctr"/>
+          <a:lstStyle/>
+          <a:p>
+            <a:pPr marL="0" marR="0" lvl="0" indent="0" algn="ctr" defTabSz="914400" rtl="0" eaLnBrk="1" fontAlgn="auto" latinLnBrk="0" hangingPunct="1">
+              <a:lnSpc>
+                <a:spcPct val="100000"/>
+              </a:lnSpc>
+              <a:spcBef>
+                <a:spcPts val="0"/>
+              </a:spcBef>
+              <a:spcAft>
+                <a:spcPts val="0"/>
+              </a:spcAft>
+              <a:buClrTx/>
+              <a:buSzTx/>
+              <a:buFontTx/>
+              <a:buNone/>
+              <a:tabLst/>
+              <a:defRPr/>
+            </a:pPr>
+            <a:endParaRPr kumimoji="0" lang="pt-BR" sz="1800" b="0" i="0" u="none" strike="noStrike" kern="1200" cap="none" spc="0" normalizeH="0" baseline="0" noProof="0" dirty="0">
+              <a:ln>
+                <a:noFill/>
+              </a:ln>
+              <a:solidFill>
+                <a:prstClr val="white"/>
+              </a:solidFill>
+              <a:effectLst/>
+              <a:uLnTx/>
+              <a:uFillTx/>
+              <a:latin typeface="Calibri" panose="020F0502020204030204"/>
+              <a:ea typeface="+mn-ea"/>
+              <a:cs typeface="+mn-cs"/>
+            </a:endParaRPr>
+          </a:p>
+        </p:txBody>
+      </p:sp>
+      <p:sp>
+        <p:nvSpPr>
+          <p:cNvPr id="9" name="Content Placeholder 8">
+            <a:extLst>
+              <a:ext uri="{FF2B5EF4-FFF2-40B4-BE49-F238E27FC236}">
+                <a16:creationId xmlns:a16="http://schemas.microsoft.com/office/drawing/2014/main" id="{C527C642-A52A-10FB-BBBF-3D53E8C70DDD}"/>
+              </a:ext>
+            </a:extLst>
+          </p:cNvPr>
+          <p:cNvSpPr>
+            <a:spLocks noGrp="1"/>
+          </p:cNvSpPr>
+          <p:nvPr>
+            <p:ph idx="1"/>
+          </p:nvPr>
+        </p:nvSpPr>
+        <p:spPr>
+          <a:xfrm>
+            <a:off x="371093" y="2718053"/>
+            <a:ext cx="5724907" cy="3743131"/>
+          </a:xfrm>
+        </p:spPr>
+        <p:txBody>
+          <a:bodyPr anchor="t">
+            <a:normAutofit/>
+          </a:bodyPr>
+          <a:lstStyle/>
+          <a:p>
+            <a:pPr algn="just"/>
+            <a:r>
+              <a:rPr lang="pt-BR" sz="1700" b="1" noProof="0" dirty="0">
+                <a:solidFill>
+                  <a:schemeClr val="bg1"/>
+                </a:solidFill>
+              </a:rPr>
+              <a:t>A taxa contratada tem um poder médio de separação em relação as sentenças</a:t>
+            </a:r>
+            <a:r>
+              <a:rPr lang="pt-BR" sz="1700" b="1" dirty="0">
+                <a:solidFill>
+                  <a:schemeClr val="bg1"/>
+                </a:solidFill>
+              </a:rPr>
+              <a:t>;</a:t>
+            </a:r>
+          </a:p>
+          <a:p>
+            <a:pPr algn="just"/>
+            <a:r>
+              <a:rPr lang="pt-BR" sz="1700" b="1" noProof="0" dirty="0">
+                <a:solidFill>
+                  <a:schemeClr val="bg1"/>
+                </a:solidFill>
+              </a:rPr>
+              <a:t>A região e a estratégia explicam 61% da taxa contratada.</a:t>
+            </a:r>
+          </a:p>
+        </p:txBody>
+      </p:sp>
+    </p:spTree>
+    <p:extLst>
+      <p:ext uri="{BB962C8B-B14F-4D97-AF65-F5344CB8AC3E}">
+        <p14:creationId xmlns:p14="http://schemas.microsoft.com/office/powerpoint/2010/main" val="557315343"/>
+      </p:ext>
+    </p:extLst>
+  </p:cSld>
+  <p:clrMapOvr>
+    <a:masterClrMapping/>
+  </p:clrMapOvr>
+</p:sld>
+</file>
+
+<file path=ppt/slides/slide16.xml><?xml version="1.0" encoding="utf-8"?>
 <p:sld xmlns:a="http://schemas.openxmlformats.org/drawingml/2006/main" xmlns:r="http://schemas.openxmlformats.org/officeDocument/2006/relationships" xmlns:p="http://schemas.openxmlformats.org/presentationml/2006/main">
   <p:cSld>
     <p:bg>
@@ -5146,7 +7482,7 @@
 </p:sld>
 </file>
 
-<file path=ppt/slides/slide13.xml><?xml version="1.0" encoding="utf-8"?>
+<file path=ppt/slides/slide17.xml><?xml version="1.0" encoding="utf-8"?>
 <p:sld xmlns:a="http://schemas.openxmlformats.org/drawingml/2006/main" xmlns:r="http://schemas.openxmlformats.org/officeDocument/2006/relationships" xmlns:p="http://schemas.openxmlformats.org/presentationml/2006/main">
   <p:cSld>
     <p:bg>
@@ -6503,7 +8839,7 @@
                   <a:schemeClr val="bg1"/>
                 </a:solidFill>
               </a:rPr>
-              <a:t>Objetivo do Trabalho</a:t>
+              <a:t>Introdução e Objetivo do Trabalho</a:t>
             </a:r>
           </a:p>
         </p:txBody>
@@ -9770,7 +12106,7 @@
         <p:cNvPr id="1" name="">
           <a:extLst>
             <a:ext uri="{FF2B5EF4-FFF2-40B4-BE49-F238E27FC236}">
-              <a16:creationId xmlns:a16="http://schemas.microsoft.com/office/drawing/2014/main" id="{D682E1FD-37FD-58E7-D051-26231380E627}"/>
+              <a16:creationId xmlns:a16="http://schemas.microsoft.com/office/drawing/2014/main" id="{672D0A83-ED75-1098-4F81-B29688CCFD49}"/>
             </a:ext>
           </a:extLst>
         </p:cNvPr>
@@ -9790,7 +12126,7 @@
           <p:cNvPr id="19" name="Rectangle 11">
             <a:extLst>
               <a:ext uri="{FF2B5EF4-FFF2-40B4-BE49-F238E27FC236}">
-                <a16:creationId xmlns:a16="http://schemas.microsoft.com/office/drawing/2014/main" id="{068F545F-6516-E2AF-63F5-D8F98888B878}"/>
+                <a16:creationId xmlns:a16="http://schemas.microsoft.com/office/drawing/2014/main" id="{4713D691-D028-CBC5-C644-0E01780C4BE3}"/>
               </a:ext>
               <a:ext uri="{C183D7F6-B498-43B3-948B-1728B52AA6E4}">
                 <adec:decorative xmlns:adec="http://schemas.microsoft.com/office/drawing/2017/decorative" val="1"/>
@@ -9850,7 +12186,7 @@
           <p:cNvPr id="5" name="Espaço Reservado para Conteúdo 4" descr="Uma imagem contendo no interior, mesa, vivendo, quarto&#10;&#10;O conteúdo gerado por IA pode estar incorreto.">
             <a:extLst>
               <a:ext uri="{FF2B5EF4-FFF2-40B4-BE49-F238E27FC236}">
-                <a16:creationId xmlns:a16="http://schemas.microsoft.com/office/drawing/2014/main" id="{E416124F-2A0D-93AE-AEE9-5D1093BA8914}"/>
+                <a16:creationId xmlns:a16="http://schemas.microsoft.com/office/drawing/2014/main" id="{49FB7A30-7CB8-A5E6-2412-CC3F52847767}"/>
               </a:ext>
             </a:extLst>
           </p:cNvPr>
@@ -9885,7 +12221,7 @@
           <p:cNvPr id="20" name="Rectangle 13">
             <a:extLst>
               <a:ext uri="{FF2B5EF4-FFF2-40B4-BE49-F238E27FC236}">
-                <a16:creationId xmlns:a16="http://schemas.microsoft.com/office/drawing/2014/main" id="{CA05D59A-6080-AD77-802E-4C4CDB4D626F}"/>
+                <a16:creationId xmlns:a16="http://schemas.microsoft.com/office/drawing/2014/main" id="{126B82DD-F703-0B23-BEC2-544BEBE0A845}"/>
               </a:ext>
               <a:ext uri="{C183D7F6-B498-43B3-948B-1728B52AA6E4}">
                 <adec:decorative xmlns:adec="http://schemas.microsoft.com/office/drawing/2017/decorative" val="1"/>
@@ -9971,7 +12307,7 @@
           <p:cNvPr id="2" name="Título 1">
             <a:extLst>
               <a:ext uri="{FF2B5EF4-FFF2-40B4-BE49-F238E27FC236}">
-                <a16:creationId xmlns:a16="http://schemas.microsoft.com/office/drawing/2014/main" id="{9F4EDEF1-3319-F3B1-C32D-05155720333C}"/>
+                <a16:creationId xmlns:a16="http://schemas.microsoft.com/office/drawing/2014/main" id="{45306EF7-30EE-F1A3-D0DD-769E4518F316}"/>
               </a:ext>
             </a:extLst>
           </p:cNvPr>
@@ -10000,7 +12336,22 @@
                   <a:schemeClr val="bg1"/>
                 </a:solidFill>
               </a:rPr>
-              <a:t>Análise exploratória</a:t>
+              <a:t>Metodologia </a:t>
+            </a:r>
+            <a:br>
+              <a:rPr lang="pt-BR" sz="2800" noProof="0" dirty="0">
+                <a:solidFill>
+                  <a:schemeClr val="bg1"/>
+                </a:solidFill>
+              </a:rPr>
+            </a:br>
+            <a:r>
+              <a:rPr lang="pt-BR" sz="2800" noProof="0" dirty="0">
+                <a:solidFill>
+                  <a:schemeClr val="bg1"/>
+                </a:solidFill>
+              </a:rPr>
+              <a:t>CRISP-DM</a:t>
             </a:r>
           </a:p>
         </p:txBody>
@@ -10010,7 +12361,7 @@
           <p:cNvPr id="21" name="Rectangle 15">
             <a:extLst>
               <a:ext uri="{FF2B5EF4-FFF2-40B4-BE49-F238E27FC236}">
-                <a16:creationId xmlns:a16="http://schemas.microsoft.com/office/drawing/2014/main" id="{6FD05660-7883-E0E0-2419-389AE2DEB28D}"/>
+                <a16:creationId xmlns:a16="http://schemas.microsoft.com/office/drawing/2014/main" id="{DC2C039A-626C-B6AC-09C0-9460D68F8D76}"/>
               </a:ext>
               <a:ext uri="{C183D7F6-B498-43B3-948B-1728B52AA6E4}">
                 <adec:decorative xmlns:adec="http://schemas.microsoft.com/office/drawing/2017/decorative" val="1"/>
@@ -10078,7 +12429,7 @@
           <p:cNvPr id="18" name="Rectangle 17">
             <a:extLst>
               <a:ext uri="{FF2B5EF4-FFF2-40B4-BE49-F238E27FC236}">
-                <a16:creationId xmlns:a16="http://schemas.microsoft.com/office/drawing/2014/main" id="{19C77C16-F894-FB2A-90F4-41281E2374AE}"/>
+                <a16:creationId xmlns:a16="http://schemas.microsoft.com/office/drawing/2014/main" id="{821C7E1D-2CE7-B97B-36F8-9931FD76CB8C}"/>
               </a:ext>
               <a:ext uri="{C183D7F6-B498-43B3-948B-1728B52AA6E4}">
                 <adec:decorative xmlns:adec="http://schemas.microsoft.com/office/drawing/2017/decorative" val="1"/>
@@ -10173,7 +12524,7 @@
           <p:cNvPr id="9" name="Content Placeholder 8">
             <a:extLst>
               <a:ext uri="{FF2B5EF4-FFF2-40B4-BE49-F238E27FC236}">
-                <a16:creationId xmlns:a16="http://schemas.microsoft.com/office/drawing/2014/main" id="{CB45536C-FCE2-F789-0023-74A4558869B2}"/>
+                <a16:creationId xmlns:a16="http://schemas.microsoft.com/office/drawing/2014/main" id="{F36B235F-C2E0-3158-8D1A-356041C8D644}"/>
               </a:ext>
             </a:extLst>
           </p:cNvPr>
@@ -10187,7 +12538,7 @@
         <p:spPr>
           <a:xfrm>
             <a:off x="371093" y="2718053"/>
-            <a:ext cx="4382061" cy="3743131"/>
+            <a:ext cx="5724907" cy="3743131"/>
           </a:xfrm>
         </p:spPr>
         <p:txBody>
@@ -10196,8 +12547,256 @@
           </a:bodyPr>
           <a:lstStyle/>
           <a:p>
-            <a:pPr algn="just"/>
-            <a:endParaRPr lang="pt-BR" sz="1700" b="1" noProof="0" dirty="0">
+            <a:pPr marL="0" indent="0" algn="just">
+              <a:buNone/>
+            </a:pPr>
+            <a:r>
+              <a:rPr lang="en-US" sz="1300" b="1" noProof="0" dirty="0">
+                <a:solidFill>
+                  <a:schemeClr val="bg1"/>
+                </a:solidFill>
+              </a:rPr>
+              <a:t>A </a:t>
+            </a:r>
+            <a:r>
+              <a:rPr lang="en-US" sz="1300" b="1" noProof="0" dirty="0" err="1">
+                <a:solidFill>
+                  <a:schemeClr val="bg1"/>
+                </a:solidFill>
+              </a:rPr>
+              <a:t>metodologia</a:t>
+            </a:r>
+            <a:r>
+              <a:rPr lang="en-US" sz="1300" b="1" noProof="0" dirty="0">
+                <a:solidFill>
+                  <a:schemeClr val="bg1"/>
+                </a:solidFill>
+              </a:rPr>
+              <a:t> </a:t>
+            </a:r>
+            <a:r>
+              <a:rPr lang="en-US" sz="1300" b="1" noProof="0" dirty="0" err="1">
+                <a:solidFill>
+                  <a:schemeClr val="bg1"/>
+                </a:solidFill>
+              </a:rPr>
+              <a:t>utilizada</a:t>
+            </a:r>
+            <a:r>
+              <a:rPr lang="en-US" sz="1300" b="1" noProof="0" dirty="0">
+                <a:solidFill>
+                  <a:schemeClr val="bg1"/>
+                </a:solidFill>
+              </a:rPr>
+              <a:t> </a:t>
+            </a:r>
+            <a:r>
+              <a:rPr lang="en-US" sz="1300" b="1" noProof="0" dirty="0" err="1">
+                <a:solidFill>
+                  <a:schemeClr val="bg1"/>
+                </a:solidFill>
+              </a:rPr>
+              <a:t>neste</a:t>
+            </a:r>
+            <a:r>
+              <a:rPr lang="en-US" sz="1300" b="1" noProof="0" dirty="0">
+                <a:solidFill>
+                  <a:schemeClr val="bg1"/>
+                </a:solidFill>
+              </a:rPr>
+              <a:t> </a:t>
+            </a:r>
+            <a:r>
+              <a:rPr lang="en-US" sz="1300" b="1" noProof="0" dirty="0" err="1">
+                <a:solidFill>
+                  <a:schemeClr val="bg1"/>
+                </a:solidFill>
+              </a:rPr>
+              <a:t>projeto</a:t>
+            </a:r>
+            <a:r>
+              <a:rPr lang="en-US" sz="1300" b="1" noProof="0" dirty="0">
+                <a:solidFill>
+                  <a:schemeClr val="bg1"/>
+                </a:solidFill>
+              </a:rPr>
+              <a:t> </a:t>
+            </a:r>
+            <a:r>
+              <a:rPr lang="en-US" sz="1300" b="1" noProof="0" dirty="0" err="1">
+                <a:solidFill>
+                  <a:schemeClr val="bg1"/>
+                </a:solidFill>
+              </a:rPr>
+              <a:t>será</a:t>
+            </a:r>
+            <a:r>
+              <a:rPr lang="en-US" sz="1300" b="1" noProof="0" dirty="0">
+                <a:solidFill>
+                  <a:schemeClr val="bg1"/>
+                </a:solidFill>
+              </a:rPr>
+              <a:t> o CRISP-DM () que </a:t>
+            </a:r>
+            <a:r>
+              <a:rPr lang="en-US" sz="1300" b="1" noProof="0" dirty="0" err="1">
+                <a:solidFill>
+                  <a:schemeClr val="bg1"/>
+                </a:solidFill>
+              </a:rPr>
+              <a:t>possui</a:t>
+            </a:r>
+            <a:r>
+              <a:rPr lang="en-US" sz="1300" b="1" noProof="0" dirty="0">
+                <a:solidFill>
+                  <a:schemeClr val="bg1"/>
+                </a:solidFill>
+              </a:rPr>
+              <a:t> as </a:t>
+            </a:r>
+            <a:r>
+              <a:rPr lang="en-US" sz="1300" b="1" noProof="0" dirty="0" err="1">
+                <a:solidFill>
+                  <a:schemeClr val="bg1"/>
+                </a:solidFill>
+              </a:rPr>
+              <a:t>seguintes</a:t>
+            </a:r>
+            <a:r>
+              <a:rPr lang="en-US" sz="1300" b="1" noProof="0" dirty="0">
+                <a:solidFill>
+                  <a:schemeClr val="bg1"/>
+                </a:solidFill>
+              </a:rPr>
+              <a:t> </a:t>
+            </a:r>
+            <a:r>
+              <a:rPr lang="en-US" sz="1300" b="1" noProof="0" dirty="0" err="1">
+                <a:solidFill>
+                  <a:schemeClr val="bg1"/>
+                </a:solidFill>
+              </a:rPr>
+              <a:t>fase</a:t>
+            </a:r>
+            <a:r>
+              <a:rPr lang="en-US" sz="1300" b="1" noProof="0" dirty="0">
+                <a:solidFill>
+                  <a:schemeClr val="bg1"/>
+                </a:solidFill>
+              </a:rPr>
+              <a:t>:</a:t>
+            </a:r>
+          </a:p>
+          <a:p>
+            <a:pPr marL="0" indent="0" algn="just">
+              <a:buNone/>
+            </a:pPr>
+            <a:r>
+              <a:rPr lang="en-US" sz="1300" b="1" dirty="0">
+                <a:solidFill>
+                  <a:schemeClr val="bg1"/>
+                </a:solidFill>
+              </a:rPr>
+              <a:t>	1. </a:t>
+            </a:r>
+            <a:r>
+              <a:rPr lang="en-US" sz="1300" b="1" dirty="0" err="1">
+                <a:solidFill>
+                  <a:schemeClr val="bg1"/>
+                </a:solidFill>
+              </a:rPr>
+              <a:t>Entendimento</a:t>
+            </a:r>
+            <a:r>
+              <a:rPr lang="en-US" sz="1300" b="1" dirty="0">
+                <a:solidFill>
+                  <a:schemeClr val="bg1"/>
+                </a:solidFill>
+              </a:rPr>
+              <a:t> do Negócio;</a:t>
+            </a:r>
+          </a:p>
+          <a:p>
+            <a:pPr marL="0" indent="0" algn="just">
+              <a:buNone/>
+            </a:pPr>
+            <a:r>
+              <a:rPr lang="en-US" sz="1300" b="1" dirty="0">
+                <a:solidFill>
+                  <a:schemeClr val="bg1"/>
+                </a:solidFill>
+              </a:rPr>
+              <a:t>	2. </a:t>
+            </a:r>
+            <a:r>
+              <a:rPr lang="en-US" sz="1300" b="1" dirty="0" err="1">
+                <a:solidFill>
+                  <a:schemeClr val="bg1"/>
+                </a:solidFill>
+              </a:rPr>
+              <a:t>Entendimento</a:t>
+            </a:r>
+            <a:r>
+              <a:rPr lang="en-US" sz="1300" b="1" dirty="0">
+                <a:solidFill>
+                  <a:schemeClr val="bg1"/>
+                </a:solidFill>
+              </a:rPr>
+              <a:t> dos Dados;</a:t>
+            </a:r>
+          </a:p>
+          <a:p>
+            <a:pPr marL="0" indent="0" algn="just">
+              <a:buNone/>
+            </a:pPr>
+            <a:r>
+              <a:rPr lang="en-US" sz="1300" b="1" dirty="0">
+                <a:solidFill>
+                  <a:schemeClr val="bg1"/>
+                </a:solidFill>
+              </a:rPr>
+              <a:t>	3.</a:t>
+            </a:r>
+          </a:p>
+          <a:p>
+            <a:pPr marL="0" indent="0" algn="just">
+              <a:buNone/>
+            </a:pPr>
+            <a:r>
+              <a:rPr lang="en-US" sz="1300" b="1" dirty="0">
+                <a:solidFill>
+                  <a:schemeClr val="bg1"/>
+                </a:solidFill>
+              </a:rPr>
+              <a:t>	4.</a:t>
+            </a:r>
+          </a:p>
+          <a:p>
+            <a:pPr marL="0" indent="0" algn="just">
+              <a:buNone/>
+            </a:pPr>
+            <a:r>
+              <a:rPr lang="en-US" sz="1300" b="1" dirty="0">
+                <a:solidFill>
+                  <a:schemeClr val="bg1"/>
+                </a:solidFill>
+              </a:rPr>
+              <a:t>	5.</a:t>
+            </a:r>
+          </a:p>
+          <a:p>
+            <a:pPr marL="0" indent="0" algn="just">
+              <a:buNone/>
+            </a:pPr>
+            <a:r>
+              <a:rPr lang="en-US" sz="1300" b="1" dirty="0">
+                <a:solidFill>
+                  <a:schemeClr val="bg1"/>
+                </a:solidFill>
+              </a:rPr>
+              <a:t>	6. </a:t>
+            </a:r>
+            <a:endParaRPr lang="pt-BR" sz="1300" b="1" noProof="0" dirty="0">
               <a:solidFill>
                 <a:schemeClr val="bg1"/>
               </a:solidFill>
@@ -10208,7 +12807,7 @@
     </p:spTree>
     <p:extLst>
       <p:ext uri="{BB962C8B-B14F-4D97-AF65-F5344CB8AC3E}">
-        <p14:creationId xmlns:p14="http://schemas.microsoft.com/office/powerpoint/2010/main" val="3016640367"/>
+        <p14:creationId xmlns:p14="http://schemas.microsoft.com/office/powerpoint/2010/main" val="4153942265"/>
       </p:ext>
     </p:extLst>
   </p:cSld>

</xml_diff>